<commit_message>
Home page and footer
</commit_message>
<xml_diff>
--- a/staticfiles/images/slide.pptx
+++ b/staticfiles/images/slide.pptx
@@ -2,18 +2,18 @@
 <file path=ppt/presentation.xml><?xml version="1.0" encoding="utf-8"?>
 <p:presentation xmlns:a="http://schemas.openxmlformats.org/drawingml/2006/main" xmlns:r="http://schemas.openxmlformats.org/officeDocument/2006/relationships" xmlns:p="http://schemas.openxmlformats.org/presentationml/2006/main" saveSubsetFonts="1">
   <p:sldMasterIdLst>
-    <p:sldMasterId id="2147483648" r:id="rId1"/>
+    <p:sldMasterId id="2147483660" r:id="rId1"/>
   </p:sldMasterIdLst>
   <p:sldIdLst>
     <p:sldId id="256" r:id="rId2"/>
   </p:sldIdLst>
-  <p:sldSz cx="12192000" cy="6858000"/>
+  <p:sldSz cx="9144000" cy="6858000" type="screen4x3"/>
   <p:notesSz cx="6858000" cy="9144000"/>
   <p:defaultTextStyle>
     <a:defPPr>
       <a:defRPr lang="en-US"/>
     </a:defPPr>
-    <a:lvl1pPr marL="0" algn="l" defTabSz="914400" rtl="0" eaLnBrk="1" latinLnBrk="0" hangingPunct="1">
+    <a:lvl1pPr marL="0" algn="l" defTabSz="457200" rtl="0" eaLnBrk="1" latinLnBrk="0" hangingPunct="1">
       <a:defRPr sz="1800" kern="1200">
         <a:solidFill>
           <a:schemeClr val="tx1"/>
@@ -23,7 +23,7 @@
         <a:cs typeface="+mn-cs"/>
       </a:defRPr>
     </a:lvl1pPr>
-    <a:lvl2pPr marL="457200" algn="l" defTabSz="914400" rtl="0" eaLnBrk="1" latinLnBrk="0" hangingPunct="1">
+    <a:lvl2pPr marL="457200" algn="l" defTabSz="457200" rtl="0" eaLnBrk="1" latinLnBrk="0" hangingPunct="1">
       <a:defRPr sz="1800" kern="1200">
         <a:solidFill>
           <a:schemeClr val="tx1"/>
@@ -33,7 +33,7 @@
         <a:cs typeface="+mn-cs"/>
       </a:defRPr>
     </a:lvl2pPr>
-    <a:lvl3pPr marL="914400" algn="l" defTabSz="914400" rtl="0" eaLnBrk="1" latinLnBrk="0" hangingPunct="1">
+    <a:lvl3pPr marL="914400" algn="l" defTabSz="457200" rtl="0" eaLnBrk="1" latinLnBrk="0" hangingPunct="1">
       <a:defRPr sz="1800" kern="1200">
         <a:solidFill>
           <a:schemeClr val="tx1"/>
@@ -43,7 +43,7 @@
         <a:cs typeface="+mn-cs"/>
       </a:defRPr>
     </a:lvl3pPr>
-    <a:lvl4pPr marL="1371600" algn="l" defTabSz="914400" rtl="0" eaLnBrk="1" latinLnBrk="0" hangingPunct="1">
+    <a:lvl4pPr marL="1371600" algn="l" defTabSz="457200" rtl="0" eaLnBrk="1" latinLnBrk="0" hangingPunct="1">
       <a:defRPr sz="1800" kern="1200">
         <a:solidFill>
           <a:schemeClr val="tx1"/>
@@ -53,7 +53,7 @@
         <a:cs typeface="+mn-cs"/>
       </a:defRPr>
     </a:lvl4pPr>
-    <a:lvl5pPr marL="1828800" algn="l" defTabSz="914400" rtl="0" eaLnBrk="1" latinLnBrk="0" hangingPunct="1">
+    <a:lvl5pPr marL="1828800" algn="l" defTabSz="457200" rtl="0" eaLnBrk="1" latinLnBrk="0" hangingPunct="1">
       <a:defRPr sz="1800" kern="1200">
         <a:solidFill>
           <a:schemeClr val="tx1"/>
@@ -63,7 +63,7 @@
         <a:cs typeface="+mn-cs"/>
       </a:defRPr>
     </a:lvl5pPr>
-    <a:lvl6pPr marL="2286000" algn="l" defTabSz="914400" rtl="0" eaLnBrk="1" latinLnBrk="0" hangingPunct="1">
+    <a:lvl6pPr marL="2286000" algn="l" defTabSz="457200" rtl="0" eaLnBrk="1" latinLnBrk="0" hangingPunct="1">
       <a:defRPr sz="1800" kern="1200">
         <a:solidFill>
           <a:schemeClr val="tx1"/>
@@ -73,7 +73,7 @@
         <a:cs typeface="+mn-cs"/>
       </a:defRPr>
     </a:lvl6pPr>
-    <a:lvl7pPr marL="2743200" algn="l" defTabSz="914400" rtl="0" eaLnBrk="1" latinLnBrk="0" hangingPunct="1">
+    <a:lvl7pPr marL="2743200" algn="l" defTabSz="457200" rtl="0" eaLnBrk="1" latinLnBrk="0" hangingPunct="1">
       <a:defRPr sz="1800" kern="1200">
         <a:solidFill>
           <a:schemeClr val="tx1"/>
@@ -83,7 +83,7 @@
         <a:cs typeface="+mn-cs"/>
       </a:defRPr>
     </a:lvl7pPr>
-    <a:lvl8pPr marL="3200400" algn="l" defTabSz="914400" rtl="0" eaLnBrk="1" latinLnBrk="0" hangingPunct="1">
+    <a:lvl8pPr marL="3200400" algn="l" defTabSz="457200" rtl="0" eaLnBrk="1" latinLnBrk="0" hangingPunct="1">
       <a:defRPr sz="1800" kern="1200">
         <a:solidFill>
           <a:schemeClr val="tx1"/>
@@ -93,7 +93,7 @@
         <a:cs typeface="+mn-cs"/>
       </a:defRPr>
     </a:lvl8pPr>
-    <a:lvl9pPr marL="3657600" algn="l" defTabSz="914400" rtl="0" eaLnBrk="1" latinLnBrk="0" hangingPunct="1">
+    <a:lvl9pPr marL="3657600" algn="l" defTabSz="457200" rtl="0" eaLnBrk="1" latinLnBrk="0" hangingPunct="1">
       <a:defRPr sz="1800" kern="1200">
         <a:solidFill>
           <a:schemeClr val="tx1"/>
@@ -104,6 +104,11 @@
       </a:defRPr>
     </a:lvl9pPr>
   </p:defaultTextStyle>
+  <p:extLst>
+    <p:ext uri="{EFAFB233-063F-42B5-8137-9DF3F51BA10A}">
+      <p15:sldGuideLst xmlns:p15="http://schemas.microsoft.com/office/powerpoint/2012/main"/>
+    </p:ext>
+  </p:extLst>
 </p:presentation>
 </file>
 
@@ -126,13 +131,7 @@
       </p:grpSpPr>
       <p:sp>
         <p:nvSpPr>
-          <p:cNvPr id="2" name="Title 1">
-            <a:extLst>
-              <a:ext uri="{FF2B5EF4-FFF2-40B4-BE49-F238E27FC236}">
-                <a16:creationId xmlns:a16="http://schemas.microsoft.com/office/drawing/2014/main" id="{DCF70579-DCCF-4A53-96A8-065CA33AEC49}"/>
-              </a:ext>
-            </a:extLst>
-          </p:cNvPr>
+          <p:cNvPr id="2" name="Title 1"/>
           <p:cNvSpPr>
             <a:spLocks noGrp="1"/>
           </p:cNvSpPr>
@@ -142,8 +141,8 @@
         </p:nvSpPr>
         <p:spPr>
           <a:xfrm>
-            <a:off x="1524000" y="1122363"/>
-            <a:ext cx="9144000" cy="2387600"/>
+            <a:off x="685800" y="1122363"/>
+            <a:ext cx="7772400" cy="2387600"/>
           </a:xfrm>
         </p:spPr>
         <p:txBody>
@@ -158,18 +157,13 @@
               <a:rPr lang="en-US"/>
               <a:t>Click to edit Master title style</a:t>
             </a:r>
-          </a:p>
-        </p:txBody>
-      </p:sp>
-      <p:sp>
-        <p:nvSpPr>
-          <p:cNvPr id="3" name="Subtitle 2">
-            <a:extLst>
-              <a:ext uri="{FF2B5EF4-FFF2-40B4-BE49-F238E27FC236}">
-                <a16:creationId xmlns:a16="http://schemas.microsoft.com/office/drawing/2014/main" id="{8DE2E482-83B4-4365-A647-CCAD48E8D176}"/>
-              </a:ext>
-            </a:extLst>
-          </p:cNvPr>
+            <a:endParaRPr lang="en-US" dirty="0"/>
+          </a:p>
+        </p:txBody>
+      </p:sp>
+      <p:sp>
+        <p:nvSpPr>
+          <p:cNvPr id="3" name="Subtitle 2"/>
           <p:cNvSpPr>
             <a:spLocks noGrp="1"/>
           </p:cNvSpPr>
@@ -179,8 +173,8 @@
         </p:nvSpPr>
         <p:spPr>
           <a:xfrm>
-            <a:off x="1524000" y="3602038"/>
-            <a:ext cx="9144000" cy="1655762"/>
+            <a:off x="1143000" y="3602038"/>
+            <a:ext cx="6858000" cy="1655762"/>
           </a:xfrm>
         </p:spPr>
         <p:txBody>
@@ -228,18 +222,13 @@
               <a:rPr lang="en-US"/>
               <a:t>Click to edit Master subtitle style</a:t>
             </a:r>
-          </a:p>
-        </p:txBody>
-      </p:sp>
-      <p:sp>
-        <p:nvSpPr>
-          <p:cNvPr id="4" name="Date Placeholder 3">
-            <a:extLst>
-              <a:ext uri="{FF2B5EF4-FFF2-40B4-BE49-F238E27FC236}">
-                <a16:creationId xmlns:a16="http://schemas.microsoft.com/office/drawing/2014/main" id="{2A3D3B4F-35DB-43B4-8730-F77DFB4E42D3}"/>
-              </a:ext>
-            </a:extLst>
-          </p:cNvPr>
+            <a:endParaRPr lang="en-US" dirty="0"/>
+          </a:p>
+        </p:txBody>
+      </p:sp>
+      <p:sp>
+        <p:nvSpPr>
+          <p:cNvPr id="4" name="Date Placeholder 3"/>
           <p:cNvSpPr>
             <a:spLocks noGrp="1"/>
           </p:cNvSpPr>
@@ -254,7 +243,7 @@
           <a:p>
             <a:fld id="{66276781-C39D-41A3-861A-51EAFABC82B2}" type="datetimeFigureOut">
               <a:rPr lang="en-US" smtClean="0"/>
-              <a:t>6/3/2018</a:t>
+              <a:t>6/5/2018</a:t>
             </a:fld>
             <a:endParaRPr lang="en-US"/>
           </a:p>
@@ -262,13 +251,7 @@
       </p:sp>
       <p:sp>
         <p:nvSpPr>
-          <p:cNvPr id="5" name="Footer Placeholder 4">
-            <a:extLst>
-              <a:ext uri="{FF2B5EF4-FFF2-40B4-BE49-F238E27FC236}">
-                <a16:creationId xmlns:a16="http://schemas.microsoft.com/office/drawing/2014/main" id="{F252F1F5-F451-4154-9593-495BB3D8FB99}"/>
-              </a:ext>
-            </a:extLst>
-          </p:cNvPr>
+          <p:cNvPr id="5" name="Footer Placeholder 4"/>
           <p:cNvSpPr>
             <a:spLocks noGrp="1"/>
           </p:cNvSpPr>
@@ -287,13 +270,7 @@
       </p:sp>
       <p:sp>
         <p:nvSpPr>
-          <p:cNvPr id="6" name="Slide Number Placeholder 5">
-            <a:extLst>
-              <a:ext uri="{FF2B5EF4-FFF2-40B4-BE49-F238E27FC236}">
-                <a16:creationId xmlns:a16="http://schemas.microsoft.com/office/drawing/2014/main" id="{9F86EDBF-BE52-4D96-9DB4-47370557BF80}"/>
-              </a:ext>
-            </a:extLst>
-          </p:cNvPr>
+          <p:cNvPr id="6" name="Slide Number Placeholder 5"/>
           <p:cNvSpPr>
             <a:spLocks noGrp="1"/>
           </p:cNvSpPr>
@@ -317,7 +294,7 @@
     </p:spTree>
     <p:extLst>
       <p:ext uri="{BB962C8B-B14F-4D97-AF65-F5344CB8AC3E}">
-        <p14:creationId xmlns:p14="http://schemas.microsoft.com/office/powerpoint/2010/main" val="1385108103"/>
+        <p14:creationId xmlns:p14="http://schemas.microsoft.com/office/powerpoint/2010/main" val="796953687"/>
       </p:ext>
     </p:extLst>
   </p:cSld>
@@ -346,13 +323,7 @@
       </p:grpSpPr>
       <p:sp>
         <p:nvSpPr>
-          <p:cNvPr id="2" name="Title 1">
-            <a:extLst>
-              <a:ext uri="{FF2B5EF4-FFF2-40B4-BE49-F238E27FC236}">
-                <a16:creationId xmlns:a16="http://schemas.microsoft.com/office/drawing/2014/main" id="{420706EB-E16E-4AED-9CA0-6ACEEE1DD10A}"/>
-              </a:ext>
-            </a:extLst>
-          </p:cNvPr>
+          <p:cNvPr id="2" name="Title 1"/>
           <p:cNvSpPr>
             <a:spLocks noGrp="1"/>
           </p:cNvSpPr>
@@ -369,18 +340,13 @@
               <a:rPr lang="en-US"/>
               <a:t>Click to edit Master title style</a:t>
             </a:r>
-          </a:p>
-        </p:txBody>
-      </p:sp>
-      <p:sp>
-        <p:nvSpPr>
-          <p:cNvPr id="3" name="Vertical Text Placeholder 2">
-            <a:extLst>
-              <a:ext uri="{FF2B5EF4-FFF2-40B4-BE49-F238E27FC236}">
-                <a16:creationId xmlns:a16="http://schemas.microsoft.com/office/drawing/2014/main" id="{A652E419-A996-4BB6-954D-22F730005299}"/>
-              </a:ext>
-            </a:extLst>
-          </p:cNvPr>
+            <a:endParaRPr lang="en-US" dirty="0"/>
+          </a:p>
+        </p:txBody>
+      </p:sp>
+      <p:sp>
+        <p:nvSpPr>
+          <p:cNvPr id="3" name="Vertical Text Placeholder 2"/>
           <p:cNvSpPr>
             <a:spLocks noGrp="1"/>
           </p:cNvSpPr>
@@ -426,18 +392,13 @@
               <a:rPr lang="en-US"/>
               <a:t>Fifth level</a:t>
             </a:r>
-          </a:p>
-        </p:txBody>
-      </p:sp>
-      <p:sp>
-        <p:nvSpPr>
-          <p:cNvPr id="4" name="Date Placeholder 3">
-            <a:extLst>
-              <a:ext uri="{FF2B5EF4-FFF2-40B4-BE49-F238E27FC236}">
-                <a16:creationId xmlns:a16="http://schemas.microsoft.com/office/drawing/2014/main" id="{97436969-80A8-43EF-B50D-0BFAA6ED6A32}"/>
-              </a:ext>
-            </a:extLst>
-          </p:cNvPr>
+            <a:endParaRPr lang="en-US" dirty="0"/>
+          </a:p>
+        </p:txBody>
+      </p:sp>
+      <p:sp>
+        <p:nvSpPr>
+          <p:cNvPr id="4" name="Date Placeholder 3"/>
           <p:cNvSpPr>
             <a:spLocks noGrp="1"/>
           </p:cNvSpPr>
@@ -452,7 +413,7 @@
           <a:p>
             <a:fld id="{66276781-C39D-41A3-861A-51EAFABC82B2}" type="datetimeFigureOut">
               <a:rPr lang="en-US" smtClean="0"/>
-              <a:t>6/3/2018</a:t>
+              <a:t>6/5/2018</a:t>
             </a:fld>
             <a:endParaRPr lang="en-US"/>
           </a:p>
@@ -460,13 +421,7 @@
       </p:sp>
       <p:sp>
         <p:nvSpPr>
-          <p:cNvPr id="5" name="Footer Placeholder 4">
-            <a:extLst>
-              <a:ext uri="{FF2B5EF4-FFF2-40B4-BE49-F238E27FC236}">
-                <a16:creationId xmlns:a16="http://schemas.microsoft.com/office/drawing/2014/main" id="{A27F7D24-47CF-4876-94AF-C1E0182DFF09}"/>
-              </a:ext>
-            </a:extLst>
-          </p:cNvPr>
+          <p:cNvPr id="5" name="Footer Placeholder 4"/>
           <p:cNvSpPr>
             <a:spLocks noGrp="1"/>
           </p:cNvSpPr>
@@ -485,13 +440,7 @@
       </p:sp>
       <p:sp>
         <p:nvSpPr>
-          <p:cNvPr id="6" name="Slide Number Placeholder 5">
-            <a:extLst>
-              <a:ext uri="{FF2B5EF4-FFF2-40B4-BE49-F238E27FC236}">
-                <a16:creationId xmlns:a16="http://schemas.microsoft.com/office/drawing/2014/main" id="{8C630009-59B6-4102-AF82-C9079CA8CC5E}"/>
-              </a:ext>
-            </a:extLst>
-          </p:cNvPr>
+          <p:cNvPr id="6" name="Slide Number Placeholder 5"/>
           <p:cNvSpPr>
             <a:spLocks noGrp="1"/>
           </p:cNvSpPr>
@@ -515,7 +464,7 @@
     </p:spTree>
     <p:extLst>
       <p:ext uri="{BB962C8B-B14F-4D97-AF65-F5344CB8AC3E}">
-        <p14:creationId xmlns:p14="http://schemas.microsoft.com/office/powerpoint/2010/main" val="946745175"/>
+        <p14:creationId xmlns:p14="http://schemas.microsoft.com/office/powerpoint/2010/main" val="1736232081"/>
       </p:ext>
     </p:extLst>
   </p:cSld>
@@ -544,13 +493,7 @@
       </p:grpSpPr>
       <p:sp>
         <p:nvSpPr>
-          <p:cNvPr id="2" name="Vertical Title 1">
-            <a:extLst>
-              <a:ext uri="{FF2B5EF4-FFF2-40B4-BE49-F238E27FC236}">
-                <a16:creationId xmlns:a16="http://schemas.microsoft.com/office/drawing/2014/main" id="{290B5980-2531-4245-8DBB-D6DE125AD822}"/>
-              </a:ext>
-            </a:extLst>
-          </p:cNvPr>
+          <p:cNvPr id="2" name="Vertical Title 1"/>
           <p:cNvSpPr>
             <a:spLocks noGrp="1"/>
           </p:cNvSpPr>
@@ -560,8 +503,8 @@
         </p:nvSpPr>
         <p:spPr>
           <a:xfrm>
-            <a:off x="8724900" y="365125"/>
-            <a:ext cx="2628900" cy="5811838"/>
+            <a:off x="6543675" y="365125"/>
+            <a:ext cx="1971675" cy="5811838"/>
           </a:xfrm>
         </p:spPr>
         <p:txBody>
@@ -572,18 +515,13 @@
               <a:rPr lang="en-US"/>
               <a:t>Click to edit Master title style</a:t>
             </a:r>
-          </a:p>
-        </p:txBody>
-      </p:sp>
-      <p:sp>
-        <p:nvSpPr>
-          <p:cNvPr id="3" name="Vertical Text Placeholder 2">
-            <a:extLst>
-              <a:ext uri="{FF2B5EF4-FFF2-40B4-BE49-F238E27FC236}">
-                <a16:creationId xmlns:a16="http://schemas.microsoft.com/office/drawing/2014/main" id="{F7008580-D80F-4B3D-AC38-C81FF3FE8529}"/>
-              </a:ext>
-            </a:extLst>
-          </p:cNvPr>
+            <a:endParaRPr lang="en-US" dirty="0"/>
+          </a:p>
+        </p:txBody>
+      </p:sp>
+      <p:sp>
+        <p:nvSpPr>
+          <p:cNvPr id="3" name="Vertical Text Placeholder 2"/>
           <p:cNvSpPr>
             <a:spLocks noGrp="1"/>
           </p:cNvSpPr>
@@ -593,8 +531,8 @@
         </p:nvSpPr>
         <p:spPr>
           <a:xfrm>
-            <a:off x="838200" y="365125"/>
-            <a:ext cx="7734300" cy="5811838"/>
+            <a:off x="628650" y="365125"/>
+            <a:ext cx="5800725" cy="5811838"/>
           </a:xfrm>
         </p:spPr>
         <p:txBody>
@@ -634,18 +572,13 @@
               <a:rPr lang="en-US"/>
               <a:t>Fifth level</a:t>
             </a:r>
-          </a:p>
-        </p:txBody>
-      </p:sp>
-      <p:sp>
-        <p:nvSpPr>
-          <p:cNvPr id="4" name="Date Placeholder 3">
-            <a:extLst>
-              <a:ext uri="{FF2B5EF4-FFF2-40B4-BE49-F238E27FC236}">
-                <a16:creationId xmlns:a16="http://schemas.microsoft.com/office/drawing/2014/main" id="{0E2D3180-89E6-4FD1-BC98-F40EA12DE8F5}"/>
-              </a:ext>
-            </a:extLst>
-          </p:cNvPr>
+            <a:endParaRPr lang="en-US" dirty="0"/>
+          </a:p>
+        </p:txBody>
+      </p:sp>
+      <p:sp>
+        <p:nvSpPr>
+          <p:cNvPr id="4" name="Date Placeholder 3"/>
           <p:cNvSpPr>
             <a:spLocks noGrp="1"/>
           </p:cNvSpPr>
@@ -660,7 +593,7 @@
           <a:p>
             <a:fld id="{66276781-C39D-41A3-861A-51EAFABC82B2}" type="datetimeFigureOut">
               <a:rPr lang="en-US" smtClean="0"/>
-              <a:t>6/3/2018</a:t>
+              <a:t>6/5/2018</a:t>
             </a:fld>
             <a:endParaRPr lang="en-US"/>
           </a:p>
@@ -668,13 +601,7 @@
       </p:sp>
       <p:sp>
         <p:nvSpPr>
-          <p:cNvPr id="5" name="Footer Placeholder 4">
-            <a:extLst>
-              <a:ext uri="{FF2B5EF4-FFF2-40B4-BE49-F238E27FC236}">
-                <a16:creationId xmlns:a16="http://schemas.microsoft.com/office/drawing/2014/main" id="{EFEB8642-B7B8-4A75-9CD3-06C081B1D429}"/>
-              </a:ext>
-            </a:extLst>
-          </p:cNvPr>
+          <p:cNvPr id="5" name="Footer Placeholder 4"/>
           <p:cNvSpPr>
             <a:spLocks noGrp="1"/>
           </p:cNvSpPr>
@@ -693,13 +620,7 @@
       </p:sp>
       <p:sp>
         <p:nvSpPr>
-          <p:cNvPr id="6" name="Slide Number Placeholder 5">
-            <a:extLst>
-              <a:ext uri="{FF2B5EF4-FFF2-40B4-BE49-F238E27FC236}">
-                <a16:creationId xmlns:a16="http://schemas.microsoft.com/office/drawing/2014/main" id="{95F09D91-3F4A-4A6F-A575-1E6F051FE3ED}"/>
-              </a:ext>
-            </a:extLst>
-          </p:cNvPr>
+          <p:cNvPr id="6" name="Slide Number Placeholder 5"/>
           <p:cNvSpPr>
             <a:spLocks noGrp="1"/>
           </p:cNvSpPr>
@@ -723,7 +644,7 @@
     </p:spTree>
     <p:extLst>
       <p:ext uri="{BB962C8B-B14F-4D97-AF65-F5344CB8AC3E}">
-        <p14:creationId xmlns:p14="http://schemas.microsoft.com/office/powerpoint/2010/main" val="2621972697"/>
+        <p14:creationId xmlns:p14="http://schemas.microsoft.com/office/powerpoint/2010/main" val="1050056180"/>
       </p:ext>
     </p:extLst>
   </p:cSld>
@@ -752,13 +673,7 @@
       </p:grpSpPr>
       <p:sp>
         <p:nvSpPr>
-          <p:cNvPr id="2" name="Title 1">
-            <a:extLst>
-              <a:ext uri="{FF2B5EF4-FFF2-40B4-BE49-F238E27FC236}">
-                <a16:creationId xmlns:a16="http://schemas.microsoft.com/office/drawing/2014/main" id="{07BB1C7F-029D-419C-8F80-99578E0F9566}"/>
-              </a:ext>
-            </a:extLst>
-          </p:cNvPr>
+          <p:cNvPr id="2" name="Title 1"/>
           <p:cNvSpPr>
             <a:spLocks noGrp="1"/>
           </p:cNvSpPr>
@@ -775,18 +690,13 @@
               <a:rPr lang="en-US"/>
               <a:t>Click to edit Master title style</a:t>
             </a:r>
-          </a:p>
-        </p:txBody>
-      </p:sp>
-      <p:sp>
-        <p:nvSpPr>
-          <p:cNvPr id="3" name="Content Placeholder 2">
-            <a:extLst>
-              <a:ext uri="{FF2B5EF4-FFF2-40B4-BE49-F238E27FC236}">
-                <a16:creationId xmlns:a16="http://schemas.microsoft.com/office/drawing/2014/main" id="{F59DD751-CE31-4708-8290-7456474C023E}"/>
-              </a:ext>
-            </a:extLst>
-          </p:cNvPr>
+            <a:endParaRPr lang="en-US" dirty="0"/>
+          </a:p>
+        </p:txBody>
+      </p:sp>
+      <p:sp>
+        <p:nvSpPr>
+          <p:cNvPr id="3" name="Content Placeholder 2"/>
           <p:cNvSpPr>
             <a:spLocks noGrp="1"/>
           </p:cNvSpPr>
@@ -832,18 +742,13 @@
               <a:rPr lang="en-US"/>
               <a:t>Fifth level</a:t>
             </a:r>
-          </a:p>
-        </p:txBody>
-      </p:sp>
-      <p:sp>
-        <p:nvSpPr>
-          <p:cNvPr id="4" name="Date Placeholder 3">
-            <a:extLst>
-              <a:ext uri="{FF2B5EF4-FFF2-40B4-BE49-F238E27FC236}">
-                <a16:creationId xmlns:a16="http://schemas.microsoft.com/office/drawing/2014/main" id="{6B0CB736-F43A-4F65-88DE-CBFE274C5699}"/>
-              </a:ext>
-            </a:extLst>
-          </p:cNvPr>
+            <a:endParaRPr lang="en-US" dirty="0"/>
+          </a:p>
+        </p:txBody>
+      </p:sp>
+      <p:sp>
+        <p:nvSpPr>
+          <p:cNvPr id="4" name="Date Placeholder 3"/>
           <p:cNvSpPr>
             <a:spLocks noGrp="1"/>
           </p:cNvSpPr>
@@ -858,7 +763,7 @@
           <a:p>
             <a:fld id="{66276781-C39D-41A3-861A-51EAFABC82B2}" type="datetimeFigureOut">
               <a:rPr lang="en-US" smtClean="0"/>
-              <a:t>6/3/2018</a:t>
+              <a:t>6/5/2018</a:t>
             </a:fld>
             <a:endParaRPr lang="en-US"/>
           </a:p>
@@ -866,13 +771,7 @@
       </p:sp>
       <p:sp>
         <p:nvSpPr>
-          <p:cNvPr id="5" name="Footer Placeholder 4">
-            <a:extLst>
-              <a:ext uri="{FF2B5EF4-FFF2-40B4-BE49-F238E27FC236}">
-                <a16:creationId xmlns:a16="http://schemas.microsoft.com/office/drawing/2014/main" id="{8A5EFE25-F716-4712-BA87-9CC5F4682478}"/>
-              </a:ext>
-            </a:extLst>
-          </p:cNvPr>
+          <p:cNvPr id="5" name="Footer Placeholder 4"/>
           <p:cNvSpPr>
             <a:spLocks noGrp="1"/>
           </p:cNvSpPr>
@@ -891,13 +790,7 @@
       </p:sp>
       <p:sp>
         <p:nvSpPr>
-          <p:cNvPr id="6" name="Slide Number Placeholder 5">
-            <a:extLst>
-              <a:ext uri="{FF2B5EF4-FFF2-40B4-BE49-F238E27FC236}">
-                <a16:creationId xmlns:a16="http://schemas.microsoft.com/office/drawing/2014/main" id="{C8A1F591-7808-48EB-8495-1AB097F5C0EE}"/>
-              </a:ext>
-            </a:extLst>
-          </p:cNvPr>
+          <p:cNvPr id="6" name="Slide Number Placeholder 5"/>
           <p:cNvSpPr>
             <a:spLocks noGrp="1"/>
           </p:cNvSpPr>
@@ -921,7 +814,7 @@
     </p:spTree>
     <p:extLst>
       <p:ext uri="{BB962C8B-B14F-4D97-AF65-F5344CB8AC3E}">
-        <p14:creationId xmlns:p14="http://schemas.microsoft.com/office/powerpoint/2010/main" val="3386331469"/>
+        <p14:creationId xmlns:p14="http://schemas.microsoft.com/office/powerpoint/2010/main" val="2831734066"/>
       </p:ext>
     </p:extLst>
   </p:cSld>
@@ -950,13 +843,7 @@
       </p:grpSpPr>
       <p:sp>
         <p:nvSpPr>
-          <p:cNvPr id="2" name="Title 1">
-            <a:extLst>
-              <a:ext uri="{FF2B5EF4-FFF2-40B4-BE49-F238E27FC236}">
-                <a16:creationId xmlns:a16="http://schemas.microsoft.com/office/drawing/2014/main" id="{E4756F74-42F3-4427-81D9-B2B5F5C9E4EA}"/>
-              </a:ext>
-            </a:extLst>
-          </p:cNvPr>
+          <p:cNvPr id="2" name="Title 1"/>
           <p:cNvSpPr>
             <a:spLocks noGrp="1"/>
           </p:cNvSpPr>
@@ -966,8 +853,8 @@
         </p:nvSpPr>
         <p:spPr>
           <a:xfrm>
-            <a:off x="831850" y="1709738"/>
-            <a:ext cx="10515600" cy="2852737"/>
+            <a:off x="623888" y="1709739"/>
+            <a:ext cx="7886700" cy="2852737"/>
           </a:xfrm>
         </p:spPr>
         <p:txBody>
@@ -982,18 +869,13 @@
               <a:rPr lang="en-US"/>
               <a:t>Click to edit Master title style</a:t>
             </a:r>
-          </a:p>
-        </p:txBody>
-      </p:sp>
-      <p:sp>
-        <p:nvSpPr>
-          <p:cNvPr id="3" name="Text Placeholder 2">
-            <a:extLst>
-              <a:ext uri="{FF2B5EF4-FFF2-40B4-BE49-F238E27FC236}">
-                <a16:creationId xmlns:a16="http://schemas.microsoft.com/office/drawing/2014/main" id="{1D969042-8A3F-449A-84CC-B3C3011787ED}"/>
-              </a:ext>
-            </a:extLst>
-          </p:cNvPr>
+            <a:endParaRPr lang="en-US" dirty="0"/>
+          </a:p>
+        </p:txBody>
+      </p:sp>
+      <p:sp>
+        <p:nvSpPr>
+          <p:cNvPr id="3" name="Text Placeholder 2"/>
           <p:cNvSpPr>
             <a:spLocks noGrp="1"/>
           </p:cNvSpPr>
@@ -1003,8 +885,8 @@
         </p:nvSpPr>
         <p:spPr>
           <a:xfrm>
-            <a:off x="831850" y="4589463"/>
-            <a:ext cx="10515600" cy="1500187"/>
+            <a:off x="623888" y="4589464"/>
+            <a:ext cx="7886700" cy="1500187"/>
           </a:xfrm>
         </p:spPr>
         <p:txBody>
@@ -1014,9 +896,7 @@
               <a:buNone/>
               <a:defRPr sz="2400">
                 <a:solidFill>
-                  <a:schemeClr val="tx1">
-                    <a:tint val="75000"/>
-                  </a:schemeClr>
+                  <a:schemeClr val="tx1"/>
                 </a:solidFill>
               </a:defRPr>
             </a:lvl1pPr>
@@ -1112,13 +992,7 @@
       </p:sp>
       <p:sp>
         <p:nvSpPr>
-          <p:cNvPr id="4" name="Date Placeholder 3">
-            <a:extLst>
-              <a:ext uri="{FF2B5EF4-FFF2-40B4-BE49-F238E27FC236}">
-                <a16:creationId xmlns:a16="http://schemas.microsoft.com/office/drawing/2014/main" id="{CD0EC7BA-6B56-4317-A0B2-B40AACE1F02E}"/>
-              </a:ext>
-            </a:extLst>
-          </p:cNvPr>
+          <p:cNvPr id="4" name="Date Placeholder 3"/>
           <p:cNvSpPr>
             <a:spLocks noGrp="1"/>
           </p:cNvSpPr>
@@ -1133,7 +1007,7 @@
           <a:p>
             <a:fld id="{66276781-C39D-41A3-861A-51EAFABC82B2}" type="datetimeFigureOut">
               <a:rPr lang="en-US" smtClean="0"/>
-              <a:t>6/3/2018</a:t>
+              <a:t>6/5/2018</a:t>
             </a:fld>
             <a:endParaRPr lang="en-US"/>
           </a:p>
@@ -1141,13 +1015,7 @@
       </p:sp>
       <p:sp>
         <p:nvSpPr>
-          <p:cNvPr id="5" name="Footer Placeholder 4">
-            <a:extLst>
-              <a:ext uri="{FF2B5EF4-FFF2-40B4-BE49-F238E27FC236}">
-                <a16:creationId xmlns:a16="http://schemas.microsoft.com/office/drawing/2014/main" id="{4F728E12-D2F8-46EA-95E4-E0CC1A346249}"/>
-              </a:ext>
-            </a:extLst>
-          </p:cNvPr>
+          <p:cNvPr id="5" name="Footer Placeholder 4"/>
           <p:cNvSpPr>
             <a:spLocks noGrp="1"/>
           </p:cNvSpPr>
@@ -1166,13 +1034,7 @@
       </p:sp>
       <p:sp>
         <p:nvSpPr>
-          <p:cNvPr id="6" name="Slide Number Placeholder 5">
-            <a:extLst>
-              <a:ext uri="{FF2B5EF4-FFF2-40B4-BE49-F238E27FC236}">
-                <a16:creationId xmlns:a16="http://schemas.microsoft.com/office/drawing/2014/main" id="{E634314F-1CD4-43E8-8457-B33852DC79B0}"/>
-              </a:ext>
-            </a:extLst>
-          </p:cNvPr>
+          <p:cNvPr id="6" name="Slide Number Placeholder 5"/>
           <p:cNvSpPr>
             <a:spLocks noGrp="1"/>
           </p:cNvSpPr>
@@ -1196,7 +1058,7 @@
     </p:spTree>
     <p:extLst>
       <p:ext uri="{BB962C8B-B14F-4D97-AF65-F5344CB8AC3E}">
-        <p14:creationId xmlns:p14="http://schemas.microsoft.com/office/powerpoint/2010/main" val="4010551945"/>
+        <p14:creationId xmlns:p14="http://schemas.microsoft.com/office/powerpoint/2010/main" val="1890899235"/>
       </p:ext>
     </p:extLst>
   </p:cSld>
@@ -1225,13 +1087,7 @@
       </p:grpSpPr>
       <p:sp>
         <p:nvSpPr>
-          <p:cNvPr id="2" name="Title 1">
-            <a:extLst>
-              <a:ext uri="{FF2B5EF4-FFF2-40B4-BE49-F238E27FC236}">
-                <a16:creationId xmlns:a16="http://schemas.microsoft.com/office/drawing/2014/main" id="{1EB0EF81-D8DF-4D29-B506-FC3FAADE06D8}"/>
-              </a:ext>
-            </a:extLst>
-          </p:cNvPr>
+          <p:cNvPr id="2" name="Title 1"/>
           <p:cNvSpPr>
             <a:spLocks noGrp="1"/>
           </p:cNvSpPr>
@@ -1248,18 +1104,13 @@
               <a:rPr lang="en-US"/>
               <a:t>Click to edit Master title style</a:t>
             </a:r>
-          </a:p>
-        </p:txBody>
-      </p:sp>
-      <p:sp>
-        <p:nvSpPr>
-          <p:cNvPr id="3" name="Content Placeholder 2">
-            <a:extLst>
-              <a:ext uri="{FF2B5EF4-FFF2-40B4-BE49-F238E27FC236}">
-                <a16:creationId xmlns:a16="http://schemas.microsoft.com/office/drawing/2014/main" id="{5900C9C8-21ED-47ED-B495-A2668936A275}"/>
-              </a:ext>
-            </a:extLst>
-          </p:cNvPr>
+            <a:endParaRPr lang="en-US" dirty="0"/>
+          </a:p>
+        </p:txBody>
+      </p:sp>
+      <p:sp>
+        <p:nvSpPr>
+          <p:cNvPr id="3" name="Content Placeholder 2"/>
           <p:cNvSpPr>
             <a:spLocks noGrp="1"/>
           </p:cNvSpPr>
@@ -1269,8 +1120,8 @@
         </p:nvSpPr>
         <p:spPr>
           <a:xfrm>
-            <a:off x="838200" y="1825625"/>
-            <a:ext cx="5181600" cy="4351338"/>
+            <a:off x="628650" y="1825625"/>
+            <a:ext cx="3886200" cy="4351338"/>
           </a:xfrm>
         </p:spPr>
         <p:txBody>
@@ -1310,18 +1161,13 @@
               <a:rPr lang="en-US"/>
               <a:t>Fifth level</a:t>
             </a:r>
-          </a:p>
-        </p:txBody>
-      </p:sp>
-      <p:sp>
-        <p:nvSpPr>
-          <p:cNvPr id="4" name="Content Placeholder 3">
-            <a:extLst>
-              <a:ext uri="{FF2B5EF4-FFF2-40B4-BE49-F238E27FC236}">
-                <a16:creationId xmlns:a16="http://schemas.microsoft.com/office/drawing/2014/main" id="{EF038D58-B84F-4989-A33D-ECF283963E4D}"/>
-              </a:ext>
-            </a:extLst>
-          </p:cNvPr>
+            <a:endParaRPr lang="en-US" dirty="0"/>
+          </a:p>
+        </p:txBody>
+      </p:sp>
+      <p:sp>
+        <p:nvSpPr>
+          <p:cNvPr id="4" name="Content Placeholder 3"/>
           <p:cNvSpPr>
             <a:spLocks noGrp="1"/>
           </p:cNvSpPr>
@@ -1331,8 +1177,8 @@
         </p:nvSpPr>
         <p:spPr>
           <a:xfrm>
-            <a:off x="6172200" y="1825625"/>
-            <a:ext cx="5181600" cy="4351338"/>
+            <a:off x="4629150" y="1825625"/>
+            <a:ext cx="3886200" cy="4351338"/>
           </a:xfrm>
         </p:spPr>
         <p:txBody>
@@ -1372,18 +1218,13 @@
               <a:rPr lang="en-US"/>
               <a:t>Fifth level</a:t>
             </a:r>
-          </a:p>
-        </p:txBody>
-      </p:sp>
-      <p:sp>
-        <p:nvSpPr>
-          <p:cNvPr id="5" name="Date Placeholder 4">
-            <a:extLst>
-              <a:ext uri="{FF2B5EF4-FFF2-40B4-BE49-F238E27FC236}">
-                <a16:creationId xmlns:a16="http://schemas.microsoft.com/office/drawing/2014/main" id="{E92E6172-6A05-4700-BF1C-9B5E52124310}"/>
-              </a:ext>
-            </a:extLst>
-          </p:cNvPr>
+            <a:endParaRPr lang="en-US" dirty="0"/>
+          </a:p>
+        </p:txBody>
+      </p:sp>
+      <p:sp>
+        <p:nvSpPr>
+          <p:cNvPr id="5" name="Date Placeholder 4"/>
           <p:cNvSpPr>
             <a:spLocks noGrp="1"/>
           </p:cNvSpPr>
@@ -1398,7 +1239,7 @@
           <a:p>
             <a:fld id="{66276781-C39D-41A3-861A-51EAFABC82B2}" type="datetimeFigureOut">
               <a:rPr lang="en-US" smtClean="0"/>
-              <a:t>6/3/2018</a:t>
+              <a:t>6/5/2018</a:t>
             </a:fld>
             <a:endParaRPr lang="en-US"/>
           </a:p>
@@ -1406,13 +1247,7 @@
       </p:sp>
       <p:sp>
         <p:nvSpPr>
-          <p:cNvPr id="6" name="Footer Placeholder 5">
-            <a:extLst>
-              <a:ext uri="{FF2B5EF4-FFF2-40B4-BE49-F238E27FC236}">
-                <a16:creationId xmlns:a16="http://schemas.microsoft.com/office/drawing/2014/main" id="{18964146-14E2-498B-8F0A-F9247F1405C0}"/>
-              </a:ext>
-            </a:extLst>
-          </p:cNvPr>
+          <p:cNvPr id="6" name="Footer Placeholder 5"/>
           <p:cNvSpPr>
             <a:spLocks noGrp="1"/>
           </p:cNvSpPr>
@@ -1431,13 +1266,7 @@
       </p:sp>
       <p:sp>
         <p:nvSpPr>
-          <p:cNvPr id="7" name="Slide Number Placeholder 6">
-            <a:extLst>
-              <a:ext uri="{FF2B5EF4-FFF2-40B4-BE49-F238E27FC236}">
-                <a16:creationId xmlns:a16="http://schemas.microsoft.com/office/drawing/2014/main" id="{3E811168-BBCE-4E74-8EE4-286BD2599F24}"/>
-              </a:ext>
-            </a:extLst>
-          </p:cNvPr>
+          <p:cNvPr id="7" name="Slide Number Placeholder 6"/>
           <p:cNvSpPr>
             <a:spLocks noGrp="1"/>
           </p:cNvSpPr>
@@ -1461,7 +1290,7 @@
     </p:spTree>
     <p:extLst>
       <p:ext uri="{BB962C8B-B14F-4D97-AF65-F5344CB8AC3E}">
-        <p14:creationId xmlns:p14="http://schemas.microsoft.com/office/powerpoint/2010/main" val="551305503"/>
+        <p14:creationId xmlns:p14="http://schemas.microsoft.com/office/powerpoint/2010/main" val="3470609378"/>
       </p:ext>
     </p:extLst>
   </p:cSld>
@@ -1490,13 +1319,7 @@
       </p:grpSpPr>
       <p:sp>
         <p:nvSpPr>
-          <p:cNvPr id="2" name="Title 1">
-            <a:extLst>
-              <a:ext uri="{FF2B5EF4-FFF2-40B4-BE49-F238E27FC236}">
-                <a16:creationId xmlns:a16="http://schemas.microsoft.com/office/drawing/2014/main" id="{12943F47-2ED1-4EA9-B42F-F780C06C7C2A}"/>
-              </a:ext>
-            </a:extLst>
-          </p:cNvPr>
+          <p:cNvPr id="2" name="Title 1"/>
           <p:cNvSpPr>
             <a:spLocks noGrp="1"/>
           </p:cNvSpPr>
@@ -1506,8 +1329,8 @@
         </p:nvSpPr>
         <p:spPr>
           <a:xfrm>
-            <a:off x="839788" y="365125"/>
-            <a:ext cx="10515600" cy="1325563"/>
+            <a:off x="629841" y="365126"/>
+            <a:ext cx="7886700" cy="1325563"/>
           </a:xfrm>
         </p:spPr>
         <p:txBody>
@@ -1518,18 +1341,13 @@
               <a:rPr lang="en-US"/>
               <a:t>Click to edit Master title style</a:t>
             </a:r>
-          </a:p>
-        </p:txBody>
-      </p:sp>
-      <p:sp>
-        <p:nvSpPr>
-          <p:cNvPr id="3" name="Text Placeholder 2">
-            <a:extLst>
-              <a:ext uri="{FF2B5EF4-FFF2-40B4-BE49-F238E27FC236}">
-                <a16:creationId xmlns:a16="http://schemas.microsoft.com/office/drawing/2014/main" id="{8CC019A2-3B2E-4F10-AB7D-AA4C1743E1C6}"/>
-              </a:ext>
-            </a:extLst>
-          </p:cNvPr>
+            <a:endParaRPr lang="en-US" dirty="0"/>
+          </a:p>
+        </p:txBody>
+      </p:sp>
+      <p:sp>
+        <p:nvSpPr>
+          <p:cNvPr id="3" name="Text Placeholder 2"/>
           <p:cNvSpPr>
             <a:spLocks noGrp="1"/>
           </p:cNvSpPr>
@@ -1539,8 +1357,8 @@
         </p:nvSpPr>
         <p:spPr>
           <a:xfrm>
-            <a:off x="839788" y="1681163"/>
-            <a:ext cx="5157787" cy="823912"/>
+            <a:off x="629842" y="1681163"/>
+            <a:ext cx="3868340" cy="823912"/>
           </a:xfrm>
         </p:spPr>
         <p:txBody>
@@ -1594,13 +1412,7 @@
       </p:sp>
       <p:sp>
         <p:nvSpPr>
-          <p:cNvPr id="4" name="Content Placeholder 3">
-            <a:extLst>
-              <a:ext uri="{FF2B5EF4-FFF2-40B4-BE49-F238E27FC236}">
-                <a16:creationId xmlns:a16="http://schemas.microsoft.com/office/drawing/2014/main" id="{CD7EE1A2-0795-4554-B809-970307F3FA27}"/>
-              </a:ext>
-            </a:extLst>
-          </p:cNvPr>
+          <p:cNvPr id="4" name="Content Placeholder 3"/>
           <p:cNvSpPr>
             <a:spLocks noGrp="1"/>
           </p:cNvSpPr>
@@ -1610,8 +1422,8 @@
         </p:nvSpPr>
         <p:spPr>
           <a:xfrm>
-            <a:off x="839788" y="2505075"/>
-            <a:ext cx="5157787" cy="3684588"/>
+            <a:off x="629842" y="2505075"/>
+            <a:ext cx="3868340" cy="3684588"/>
           </a:xfrm>
         </p:spPr>
         <p:txBody>
@@ -1651,18 +1463,13 @@
               <a:rPr lang="en-US"/>
               <a:t>Fifth level</a:t>
             </a:r>
-          </a:p>
-        </p:txBody>
-      </p:sp>
-      <p:sp>
-        <p:nvSpPr>
-          <p:cNvPr id="5" name="Text Placeholder 4">
-            <a:extLst>
-              <a:ext uri="{FF2B5EF4-FFF2-40B4-BE49-F238E27FC236}">
-                <a16:creationId xmlns:a16="http://schemas.microsoft.com/office/drawing/2014/main" id="{A5899AD5-B6E4-4854-9BD7-77475B8CFFA3}"/>
-              </a:ext>
-            </a:extLst>
-          </p:cNvPr>
+            <a:endParaRPr lang="en-US" dirty="0"/>
+          </a:p>
+        </p:txBody>
+      </p:sp>
+      <p:sp>
+        <p:nvSpPr>
+          <p:cNvPr id="5" name="Text Placeholder 4"/>
           <p:cNvSpPr>
             <a:spLocks noGrp="1"/>
           </p:cNvSpPr>
@@ -1672,8 +1479,8 @@
         </p:nvSpPr>
         <p:spPr>
           <a:xfrm>
-            <a:off x="6172200" y="1681163"/>
-            <a:ext cx="5183188" cy="823912"/>
+            <a:off x="4629150" y="1681163"/>
+            <a:ext cx="3887391" cy="823912"/>
           </a:xfrm>
         </p:spPr>
         <p:txBody>
@@ -1727,13 +1534,7 @@
       </p:sp>
       <p:sp>
         <p:nvSpPr>
-          <p:cNvPr id="6" name="Content Placeholder 5">
-            <a:extLst>
-              <a:ext uri="{FF2B5EF4-FFF2-40B4-BE49-F238E27FC236}">
-                <a16:creationId xmlns:a16="http://schemas.microsoft.com/office/drawing/2014/main" id="{2107892D-0B3F-48C3-B626-309918243D06}"/>
-              </a:ext>
-            </a:extLst>
-          </p:cNvPr>
+          <p:cNvPr id="6" name="Content Placeholder 5"/>
           <p:cNvSpPr>
             <a:spLocks noGrp="1"/>
           </p:cNvSpPr>
@@ -1743,8 +1544,8 @@
         </p:nvSpPr>
         <p:spPr>
           <a:xfrm>
-            <a:off x="6172200" y="2505075"/>
-            <a:ext cx="5183188" cy="3684588"/>
+            <a:off x="4629150" y="2505075"/>
+            <a:ext cx="3887391" cy="3684588"/>
           </a:xfrm>
         </p:spPr>
         <p:txBody>
@@ -1784,18 +1585,13 @@
               <a:rPr lang="en-US"/>
               <a:t>Fifth level</a:t>
             </a:r>
-          </a:p>
-        </p:txBody>
-      </p:sp>
-      <p:sp>
-        <p:nvSpPr>
-          <p:cNvPr id="7" name="Date Placeholder 6">
-            <a:extLst>
-              <a:ext uri="{FF2B5EF4-FFF2-40B4-BE49-F238E27FC236}">
-                <a16:creationId xmlns:a16="http://schemas.microsoft.com/office/drawing/2014/main" id="{2662CD43-1B2F-4101-8A2B-1637A3994B0E}"/>
-              </a:ext>
-            </a:extLst>
-          </p:cNvPr>
+            <a:endParaRPr lang="en-US" dirty="0"/>
+          </a:p>
+        </p:txBody>
+      </p:sp>
+      <p:sp>
+        <p:nvSpPr>
+          <p:cNvPr id="7" name="Date Placeholder 6"/>
           <p:cNvSpPr>
             <a:spLocks noGrp="1"/>
           </p:cNvSpPr>
@@ -1810,7 +1606,7 @@
           <a:p>
             <a:fld id="{66276781-C39D-41A3-861A-51EAFABC82B2}" type="datetimeFigureOut">
               <a:rPr lang="en-US" smtClean="0"/>
-              <a:t>6/3/2018</a:t>
+              <a:t>6/5/2018</a:t>
             </a:fld>
             <a:endParaRPr lang="en-US"/>
           </a:p>
@@ -1818,13 +1614,7 @@
       </p:sp>
       <p:sp>
         <p:nvSpPr>
-          <p:cNvPr id="8" name="Footer Placeholder 7">
-            <a:extLst>
-              <a:ext uri="{FF2B5EF4-FFF2-40B4-BE49-F238E27FC236}">
-                <a16:creationId xmlns:a16="http://schemas.microsoft.com/office/drawing/2014/main" id="{8DB03859-3C7E-412D-81F2-92CA1E91098E}"/>
-              </a:ext>
-            </a:extLst>
-          </p:cNvPr>
+          <p:cNvPr id="8" name="Footer Placeholder 7"/>
           <p:cNvSpPr>
             <a:spLocks noGrp="1"/>
           </p:cNvSpPr>
@@ -1843,13 +1633,7 @@
       </p:sp>
       <p:sp>
         <p:nvSpPr>
-          <p:cNvPr id="9" name="Slide Number Placeholder 8">
-            <a:extLst>
-              <a:ext uri="{FF2B5EF4-FFF2-40B4-BE49-F238E27FC236}">
-                <a16:creationId xmlns:a16="http://schemas.microsoft.com/office/drawing/2014/main" id="{89214434-D835-44CB-9363-5AB7C483C721}"/>
-              </a:ext>
-            </a:extLst>
-          </p:cNvPr>
+          <p:cNvPr id="9" name="Slide Number Placeholder 8"/>
           <p:cNvSpPr>
             <a:spLocks noGrp="1"/>
           </p:cNvSpPr>
@@ -1873,7 +1657,7 @@
     </p:spTree>
     <p:extLst>
       <p:ext uri="{BB962C8B-B14F-4D97-AF65-F5344CB8AC3E}">
-        <p14:creationId xmlns:p14="http://schemas.microsoft.com/office/powerpoint/2010/main" val="293099746"/>
+        <p14:creationId xmlns:p14="http://schemas.microsoft.com/office/powerpoint/2010/main" val="328678359"/>
       </p:ext>
     </p:extLst>
   </p:cSld>
@@ -1902,13 +1686,7 @@
       </p:grpSpPr>
       <p:sp>
         <p:nvSpPr>
-          <p:cNvPr id="2" name="Title 1">
-            <a:extLst>
-              <a:ext uri="{FF2B5EF4-FFF2-40B4-BE49-F238E27FC236}">
-                <a16:creationId xmlns:a16="http://schemas.microsoft.com/office/drawing/2014/main" id="{6C1F174B-EB93-4FE9-913F-C00A47047585}"/>
-              </a:ext>
-            </a:extLst>
-          </p:cNvPr>
+          <p:cNvPr id="2" name="Title 1"/>
           <p:cNvSpPr>
             <a:spLocks noGrp="1"/>
           </p:cNvSpPr>
@@ -1925,18 +1703,13 @@
               <a:rPr lang="en-US"/>
               <a:t>Click to edit Master title style</a:t>
             </a:r>
-          </a:p>
-        </p:txBody>
-      </p:sp>
-      <p:sp>
-        <p:nvSpPr>
-          <p:cNvPr id="3" name="Date Placeholder 2">
-            <a:extLst>
-              <a:ext uri="{FF2B5EF4-FFF2-40B4-BE49-F238E27FC236}">
-                <a16:creationId xmlns:a16="http://schemas.microsoft.com/office/drawing/2014/main" id="{F6292384-DA53-4688-AE89-6210D0734E0B}"/>
-              </a:ext>
-            </a:extLst>
-          </p:cNvPr>
+            <a:endParaRPr lang="en-US" dirty="0"/>
+          </a:p>
+        </p:txBody>
+      </p:sp>
+      <p:sp>
+        <p:nvSpPr>
+          <p:cNvPr id="3" name="Date Placeholder 2"/>
           <p:cNvSpPr>
             <a:spLocks noGrp="1"/>
           </p:cNvSpPr>
@@ -1951,7 +1724,7 @@
           <a:p>
             <a:fld id="{66276781-C39D-41A3-861A-51EAFABC82B2}" type="datetimeFigureOut">
               <a:rPr lang="en-US" smtClean="0"/>
-              <a:t>6/3/2018</a:t>
+              <a:t>6/5/2018</a:t>
             </a:fld>
             <a:endParaRPr lang="en-US"/>
           </a:p>
@@ -1959,13 +1732,7 @@
       </p:sp>
       <p:sp>
         <p:nvSpPr>
-          <p:cNvPr id="4" name="Footer Placeholder 3">
-            <a:extLst>
-              <a:ext uri="{FF2B5EF4-FFF2-40B4-BE49-F238E27FC236}">
-                <a16:creationId xmlns:a16="http://schemas.microsoft.com/office/drawing/2014/main" id="{EE911488-1899-4EBE-995C-776BDDE8C88F}"/>
-              </a:ext>
-            </a:extLst>
-          </p:cNvPr>
+          <p:cNvPr id="4" name="Footer Placeholder 3"/>
           <p:cNvSpPr>
             <a:spLocks noGrp="1"/>
           </p:cNvSpPr>
@@ -1984,13 +1751,7 @@
       </p:sp>
       <p:sp>
         <p:nvSpPr>
-          <p:cNvPr id="5" name="Slide Number Placeholder 4">
-            <a:extLst>
-              <a:ext uri="{FF2B5EF4-FFF2-40B4-BE49-F238E27FC236}">
-                <a16:creationId xmlns:a16="http://schemas.microsoft.com/office/drawing/2014/main" id="{6D4C6510-D5E5-464E-BC0B-54C30605B62C}"/>
-              </a:ext>
-            </a:extLst>
-          </p:cNvPr>
+          <p:cNvPr id="5" name="Slide Number Placeholder 4"/>
           <p:cNvSpPr>
             <a:spLocks noGrp="1"/>
           </p:cNvSpPr>
@@ -2014,7 +1775,7 @@
     </p:spTree>
     <p:extLst>
       <p:ext uri="{BB962C8B-B14F-4D97-AF65-F5344CB8AC3E}">
-        <p14:creationId xmlns:p14="http://schemas.microsoft.com/office/powerpoint/2010/main" val="4095118578"/>
+        <p14:creationId xmlns:p14="http://schemas.microsoft.com/office/powerpoint/2010/main" val="377563130"/>
       </p:ext>
     </p:extLst>
   </p:cSld>
@@ -2043,13 +1804,7 @@
       </p:grpSpPr>
       <p:sp>
         <p:nvSpPr>
-          <p:cNvPr id="2" name="Date Placeholder 1">
-            <a:extLst>
-              <a:ext uri="{FF2B5EF4-FFF2-40B4-BE49-F238E27FC236}">
-                <a16:creationId xmlns:a16="http://schemas.microsoft.com/office/drawing/2014/main" id="{9C2E8BB4-6401-40A3-BD3D-941CD5529472}"/>
-              </a:ext>
-            </a:extLst>
-          </p:cNvPr>
+          <p:cNvPr id="2" name="Date Placeholder 1"/>
           <p:cNvSpPr>
             <a:spLocks noGrp="1"/>
           </p:cNvSpPr>
@@ -2064,7 +1819,7 @@
           <a:p>
             <a:fld id="{66276781-C39D-41A3-861A-51EAFABC82B2}" type="datetimeFigureOut">
               <a:rPr lang="en-US" smtClean="0"/>
-              <a:t>6/3/2018</a:t>
+              <a:t>6/5/2018</a:t>
             </a:fld>
             <a:endParaRPr lang="en-US"/>
           </a:p>
@@ -2072,13 +1827,7 @@
       </p:sp>
       <p:sp>
         <p:nvSpPr>
-          <p:cNvPr id="3" name="Footer Placeholder 2">
-            <a:extLst>
-              <a:ext uri="{FF2B5EF4-FFF2-40B4-BE49-F238E27FC236}">
-                <a16:creationId xmlns:a16="http://schemas.microsoft.com/office/drawing/2014/main" id="{C23670FC-65CE-44A0-92E5-FACFE95A464B}"/>
-              </a:ext>
-            </a:extLst>
-          </p:cNvPr>
+          <p:cNvPr id="3" name="Footer Placeholder 2"/>
           <p:cNvSpPr>
             <a:spLocks noGrp="1"/>
           </p:cNvSpPr>
@@ -2097,13 +1846,7 @@
       </p:sp>
       <p:sp>
         <p:nvSpPr>
-          <p:cNvPr id="4" name="Slide Number Placeholder 3">
-            <a:extLst>
-              <a:ext uri="{FF2B5EF4-FFF2-40B4-BE49-F238E27FC236}">
-                <a16:creationId xmlns:a16="http://schemas.microsoft.com/office/drawing/2014/main" id="{51C23335-9517-4A4F-AF6B-DBAE63F4FC28}"/>
-              </a:ext>
-            </a:extLst>
-          </p:cNvPr>
+          <p:cNvPr id="4" name="Slide Number Placeholder 3"/>
           <p:cNvSpPr>
             <a:spLocks noGrp="1"/>
           </p:cNvSpPr>
@@ -2127,7 +1870,7 @@
     </p:spTree>
     <p:extLst>
       <p:ext uri="{BB962C8B-B14F-4D97-AF65-F5344CB8AC3E}">
-        <p14:creationId xmlns:p14="http://schemas.microsoft.com/office/powerpoint/2010/main" val="1796894461"/>
+        <p14:creationId xmlns:p14="http://schemas.microsoft.com/office/powerpoint/2010/main" val="3298640304"/>
       </p:ext>
     </p:extLst>
   </p:cSld>
@@ -2156,13 +1899,7 @@
       </p:grpSpPr>
       <p:sp>
         <p:nvSpPr>
-          <p:cNvPr id="2" name="Title 1">
-            <a:extLst>
-              <a:ext uri="{FF2B5EF4-FFF2-40B4-BE49-F238E27FC236}">
-                <a16:creationId xmlns:a16="http://schemas.microsoft.com/office/drawing/2014/main" id="{2FAB61DF-1ECB-40E1-A9C2-60D0DC08CD0E}"/>
-              </a:ext>
-            </a:extLst>
-          </p:cNvPr>
+          <p:cNvPr id="2" name="Title 1"/>
           <p:cNvSpPr>
             <a:spLocks noGrp="1"/>
           </p:cNvSpPr>
@@ -2172,8 +1909,8 @@
         </p:nvSpPr>
         <p:spPr>
           <a:xfrm>
-            <a:off x="839788" y="457200"/>
-            <a:ext cx="3932237" cy="1600200"/>
+            <a:off x="629841" y="457200"/>
+            <a:ext cx="2949178" cy="1600200"/>
           </a:xfrm>
         </p:spPr>
         <p:txBody>
@@ -2188,18 +1925,13 @@
               <a:rPr lang="en-US"/>
               <a:t>Click to edit Master title style</a:t>
             </a:r>
-          </a:p>
-        </p:txBody>
-      </p:sp>
-      <p:sp>
-        <p:nvSpPr>
-          <p:cNvPr id="3" name="Content Placeholder 2">
-            <a:extLst>
-              <a:ext uri="{FF2B5EF4-FFF2-40B4-BE49-F238E27FC236}">
-                <a16:creationId xmlns:a16="http://schemas.microsoft.com/office/drawing/2014/main" id="{D0615ADD-1AA2-4D70-8774-94BDC117627D}"/>
-              </a:ext>
-            </a:extLst>
-          </p:cNvPr>
+            <a:endParaRPr lang="en-US" dirty="0"/>
+          </a:p>
+        </p:txBody>
+      </p:sp>
+      <p:sp>
+        <p:nvSpPr>
+          <p:cNvPr id="3" name="Content Placeholder 2"/>
           <p:cNvSpPr>
             <a:spLocks noGrp="1"/>
           </p:cNvSpPr>
@@ -2209,8 +1941,8 @@
         </p:nvSpPr>
         <p:spPr>
           <a:xfrm>
-            <a:off x="5183188" y="987425"/>
-            <a:ext cx="6172200" cy="4873625"/>
+            <a:off x="3887391" y="987426"/>
+            <a:ext cx="4629150" cy="4873625"/>
           </a:xfrm>
         </p:spPr>
         <p:txBody>
@@ -2278,18 +2010,13 @@
               <a:rPr lang="en-US"/>
               <a:t>Fifth level</a:t>
             </a:r>
-          </a:p>
-        </p:txBody>
-      </p:sp>
-      <p:sp>
-        <p:nvSpPr>
-          <p:cNvPr id="4" name="Text Placeholder 3">
-            <a:extLst>
-              <a:ext uri="{FF2B5EF4-FFF2-40B4-BE49-F238E27FC236}">
-                <a16:creationId xmlns:a16="http://schemas.microsoft.com/office/drawing/2014/main" id="{5866F2E2-D912-48C2-B686-BE4C853FBFF2}"/>
-              </a:ext>
-            </a:extLst>
-          </p:cNvPr>
+            <a:endParaRPr lang="en-US" dirty="0"/>
+          </a:p>
+        </p:txBody>
+      </p:sp>
+      <p:sp>
+        <p:nvSpPr>
+          <p:cNvPr id="4" name="Text Placeholder 3"/>
           <p:cNvSpPr>
             <a:spLocks noGrp="1"/>
           </p:cNvSpPr>
@@ -2299,8 +2026,8 @@
         </p:nvSpPr>
         <p:spPr>
           <a:xfrm>
-            <a:off x="839788" y="2057400"/>
-            <a:ext cx="3932237" cy="3811588"/>
+            <a:off x="629841" y="2057400"/>
+            <a:ext cx="2949178" cy="3811588"/>
           </a:xfrm>
         </p:spPr>
         <p:txBody>
@@ -2354,13 +2081,7 @@
       </p:sp>
       <p:sp>
         <p:nvSpPr>
-          <p:cNvPr id="5" name="Date Placeholder 4">
-            <a:extLst>
-              <a:ext uri="{FF2B5EF4-FFF2-40B4-BE49-F238E27FC236}">
-                <a16:creationId xmlns:a16="http://schemas.microsoft.com/office/drawing/2014/main" id="{234CF92C-8C0B-4AF6-B4FC-5DB94558DB54}"/>
-              </a:ext>
-            </a:extLst>
-          </p:cNvPr>
+          <p:cNvPr id="5" name="Date Placeholder 4"/>
           <p:cNvSpPr>
             <a:spLocks noGrp="1"/>
           </p:cNvSpPr>
@@ -2375,7 +2096,7 @@
           <a:p>
             <a:fld id="{66276781-C39D-41A3-861A-51EAFABC82B2}" type="datetimeFigureOut">
               <a:rPr lang="en-US" smtClean="0"/>
-              <a:t>6/3/2018</a:t>
+              <a:t>6/5/2018</a:t>
             </a:fld>
             <a:endParaRPr lang="en-US"/>
           </a:p>
@@ -2383,13 +2104,7 @@
       </p:sp>
       <p:sp>
         <p:nvSpPr>
-          <p:cNvPr id="6" name="Footer Placeholder 5">
-            <a:extLst>
-              <a:ext uri="{FF2B5EF4-FFF2-40B4-BE49-F238E27FC236}">
-                <a16:creationId xmlns:a16="http://schemas.microsoft.com/office/drawing/2014/main" id="{3B2D00D8-47E1-4ADA-8904-C92B4980531B}"/>
-              </a:ext>
-            </a:extLst>
-          </p:cNvPr>
+          <p:cNvPr id="6" name="Footer Placeholder 5"/>
           <p:cNvSpPr>
             <a:spLocks noGrp="1"/>
           </p:cNvSpPr>
@@ -2408,13 +2123,7 @@
       </p:sp>
       <p:sp>
         <p:nvSpPr>
-          <p:cNvPr id="7" name="Slide Number Placeholder 6">
-            <a:extLst>
-              <a:ext uri="{FF2B5EF4-FFF2-40B4-BE49-F238E27FC236}">
-                <a16:creationId xmlns:a16="http://schemas.microsoft.com/office/drawing/2014/main" id="{E262BCEB-BAB6-47C6-83F7-AF9BF2DA607A}"/>
-              </a:ext>
-            </a:extLst>
-          </p:cNvPr>
+          <p:cNvPr id="7" name="Slide Number Placeholder 6"/>
           <p:cNvSpPr>
             <a:spLocks noGrp="1"/>
           </p:cNvSpPr>
@@ -2438,7 +2147,7 @@
     </p:spTree>
     <p:extLst>
       <p:ext uri="{BB962C8B-B14F-4D97-AF65-F5344CB8AC3E}">
-        <p14:creationId xmlns:p14="http://schemas.microsoft.com/office/powerpoint/2010/main" val="61619851"/>
+        <p14:creationId xmlns:p14="http://schemas.microsoft.com/office/powerpoint/2010/main" val="3671429180"/>
       </p:ext>
     </p:extLst>
   </p:cSld>
@@ -2467,13 +2176,7 @@
       </p:grpSpPr>
       <p:sp>
         <p:nvSpPr>
-          <p:cNvPr id="2" name="Title 1">
-            <a:extLst>
-              <a:ext uri="{FF2B5EF4-FFF2-40B4-BE49-F238E27FC236}">
-                <a16:creationId xmlns:a16="http://schemas.microsoft.com/office/drawing/2014/main" id="{B6A3D625-CDEF-436A-BB90-B2B843E9A09C}"/>
-              </a:ext>
-            </a:extLst>
-          </p:cNvPr>
+          <p:cNvPr id="2" name="Title 1"/>
           <p:cNvSpPr>
             <a:spLocks noGrp="1"/>
           </p:cNvSpPr>
@@ -2483,8 +2186,8 @@
         </p:nvSpPr>
         <p:spPr>
           <a:xfrm>
-            <a:off x="839788" y="457200"/>
-            <a:ext cx="3932237" cy="1600200"/>
+            <a:off x="629841" y="457200"/>
+            <a:ext cx="2949178" cy="1600200"/>
           </a:xfrm>
         </p:spPr>
         <p:txBody>
@@ -2499,20 +2202,15 @@
               <a:rPr lang="en-US"/>
               <a:t>Click to edit Master title style</a:t>
             </a:r>
-          </a:p>
-        </p:txBody>
-      </p:sp>
-      <p:sp>
-        <p:nvSpPr>
-          <p:cNvPr id="3" name="Picture Placeholder 2">
-            <a:extLst>
-              <a:ext uri="{FF2B5EF4-FFF2-40B4-BE49-F238E27FC236}">
-                <a16:creationId xmlns:a16="http://schemas.microsoft.com/office/drawing/2014/main" id="{E03CCA8F-421D-465E-B2B5-8FC09B3CA84D}"/>
-              </a:ext>
-            </a:extLst>
-          </p:cNvPr>
-          <p:cNvSpPr>
-            <a:spLocks noGrp="1"/>
+            <a:endParaRPr lang="en-US" dirty="0"/>
+          </a:p>
+        </p:txBody>
+      </p:sp>
+      <p:sp>
+        <p:nvSpPr>
+          <p:cNvPr id="3" name="Picture Placeholder 2"/>
+          <p:cNvSpPr>
+            <a:spLocks noGrp="1" noChangeAspect="1"/>
           </p:cNvSpPr>
           <p:nvPr>
             <p:ph type="pic" idx="1"/>
@@ -2520,12 +2218,12 @@
         </p:nvSpPr>
         <p:spPr>
           <a:xfrm>
-            <a:off x="5183188" y="987425"/>
-            <a:ext cx="6172200" cy="4873625"/>
+            <a:off x="3887391" y="987426"/>
+            <a:ext cx="4629150" cy="4873625"/>
           </a:xfrm>
         </p:spPr>
         <p:txBody>
-          <a:bodyPr/>
+          <a:bodyPr anchor="t"/>
           <a:lstStyle>
             <a:lvl1pPr marL="0" indent="0">
               <a:buNone/>
@@ -2565,19 +2263,17 @@
             </a:lvl9pPr>
           </a:lstStyle>
           <a:p>
-            <a:endParaRPr lang="en-US"/>
-          </a:p>
-        </p:txBody>
-      </p:sp>
-      <p:sp>
-        <p:nvSpPr>
-          <p:cNvPr id="4" name="Text Placeholder 3">
-            <a:extLst>
-              <a:ext uri="{FF2B5EF4-FFF2-40B4-BE49-F238E27FC236}">
-                <a16:creationId xmlns:a16="http://schemas.microsoft.com/office/drawing/2014/main" id="{6893E486-FC5A-4898-AAD4-B9D8B1D29375}"/>
-              </a:ext>
-            </a:extLst>
-          </p:cNvPr>
+            <a:r>
+              <a:rPr lang="en-US"/>
+              <a:t>Click icon to add picture</a:t>
+            </a:r>
+            <a:endParaRPr lang="en-US" dirty="0"/>
+          </a:p>
+        </p:txBody>
+      </p:sp>
+      <p:sp>
+        <p:nvSpPr>
+          <p:cNvPr id="4" name="Text Placeholder 3"/>
           <p:cNvSpPr>
             <a:spLocks noGrp="1"/>
           </p:cNvSpPr>
@@ -2587,8 +2283,8 @@
         </p:nvSpPr>
         <p:spPr>
           <a:xfrm>
-            <a:off x="839788" y="2057400"/>
-            <a:ext cx="3932237" cy="3811588"/>
+            <a:off x="629841" y="2057400"/>
+            <a:ext cx="2949178" cy="3811588"/>
           </a:xfrm>
         </p:spPr>
         <p:txBody>
@@ -2642,13 +2338,7 @@
       </p:sp>
       <p:sp>
         <p:nvSpPr>
-          <p:cNvPr id="5" name="Date Placeholder 4">
-            <a:extLst>
-              <a:ext uri="{FF2B5EF4-FFF2-40B4-BE49-F238E27FC236}">
-                <a16:creationId xmlns:a16="http://schemas.microsoft.com/office/drawing/2014/main" id="{34404E10-8C9F-4688-B5B3-5C1F531B53DB}"/>
-              </a:ext>
-            </a:extLst>
-          </p:cNvPr>
+          <p:cNvPr id="5" name="Date Placeholder 4"/>
           <p:cNvSpPr>
             <a:spLocks noGrp="1"/>
           </p:cNvSpPr>
@@ -2663,7 +2353,7 @@
           <a:p>
             <a:fld id="{66276781-C39D-41A3-861A-51EAFABC82B2}" type="datetimeFigureOut">
               <a:rPr lang="en-US" smtClean="0"/>
-              <a:t>6/3/2018</a:t>
+              <a:t>6/5/2018</a:t>
             </a:fld>
             <a:endParaRPr lang="en-US"/>
           </a:p>
@@ -2671,13 +2361,7 @@
       </p:sp>
       <p:sp>
         <p:nvSpPr>
-          <p:cNvPr id="6" name="Footer Placeholder 5">
-            <a:extLst>
-              <a:ext uri="{FF2B5EF4-FFF2-40B4-BE49-F238E27FC236}">
-                <a16:creationId xmlns:a16="http://schemas.microsoft.com/office/drawing/2014/main" id="{EA25FC64-517D-4B62-8AF1-9BEB50C8AF0E}"/>
-              </a:ext>
-            </a:extLst>
-          </p:cNvPr>
+          <p:cNvPr id="6" name="Footer Placeholder 5"/>
           <p:cNvSpPr>
             <a:spLocks noGrp="1"/>
           </p:cNvSpPr>
@@ -2696,13 +2380,7 @@
       </p:sp>
       <p:sp>
         <p:nvSpPr>
-          <p:cNvPr id="7" name="Slide Number Placeholder 6">
-            <a:extLst>
-              <a:ext uri="{FF2B5EF4-FFF2-40B4-BE49-F238E27FC236}">
-                <a16:creationId xmlns:a16="http://schemas.microsoft.com/office/drawing/2014/main" id="{E90A844F-7139-4284-B960-8CB479FBD342}"/>
-              </a:ext>
-            </a:extLst>
-          </p:cNvPr>
+          <p:cNvPr id="7" name="Slide Number Placeholder 6"/>
           <p:cNvSpPr>
             <a:spLocks noGrp="1"/>
           </p:cNvSpPr>
@@ -2726,7 +2404,7 @@
     </p:spTree>
     <p:extLst>
       <p:ext uri="{BB962C8B-B14F-4D97-AF65-F5344CB8AC3E}">
-        <p14:creationId xmlns:p14="http://schemas.microsoft.com/office/powerpoint/2010/main" val="4064538111"/>
+        <p14:creationId xmlns:p14="http://schemas.microsoft.com/office/powerpoint/2010/main" val="3707949710"/>
       </p:ext>
     </p:extLst>
   </p:cSld>
@@ -2760,13 +2438,7 @@
       </p:grpSpPr>
       <p:sp>
         <p:nvSpPr>
-          <p:cNvPr id="2" name="Title Placeholder 1">
-            <a:extLst>
-              <a:ext uri="{FF2B5EF4-FFF2-40B4-BE49-F238E27FC236}">
-                <a16:creationId xmlns:a16="http://schemas.microsoft.com/office/drawing/2014/main" id="{7F55DB4F-4C4B-452C-A12C-D78BB82F3F59}"/>
-              </a:ext>
-            </a:extLst>
-          </p:cNvPr>
+          <p:cNvPr id="2" name="Title Placeholder 1"/>
           <p:cNvSpPr>
             <a:spLocks noGrp="1"/>
           </p:cNvSpPr>
@@ -2776,8 +2448,8 @@
         </p:nvSpPr>
         <p:spPr>
           <a:xfrm>
-            <a:off x="838200" y="365125"/>
-            <a:ext cx="10515600" cy="1325563"/>
+            <a:off x="628650" y="365126"/>
+            <a:ext cx="7886700" cy="1325563"/>
           </a:xfrm>
           <a:prstGeom prst="rect">
             <a:avLst/>
@@ -2793,18 +2465,13 @@
               <a:rPr lang="en-US"/>
               <a:t>Click to edit Master title style</a:t>
             </a:r>
-          </a:p>
-        </p:txBody>
-      </p:sp>
-      <p:sp>
-        <p:nvSpPr>
-          <p:cNvPr id="3" name="Text Placeholder 2">
-            <a:extLst>
-              <a:ext uri="{FF2B5EF4-FFF2-40B4-BE49-F238E27FC236}">
-                <a16:creationId xmlns:a16="http://schemas.microsoft.com/office/drawing/2014/main" id="{EED179BC-D596-4F18-BAF2-34A239216F61}"/>
-              </a:ext>
-            </a:extLst>
-          </p:cNvPr>
+            <a:endParaRPr lang="en-US" dirty="0"/>
+          </a:p>
+        </p:txBody>
+      </p:sp>
+      <p:sp>
+        <p:nvSpPr>
+          <p:cNvPr id="3" name="Text Placeholder 2"/>
           <p:cNvSpPr>
             <a:spLocks noGrp="1"/>
           </p:cNvSpPr>
@@ -2814,8 +2481,8 @@
         </p:nvSpPr>
         <p:spPr>
           <a:xfrm>
-            <a:off x="838200" y="1825625"/>
-            <a:ext cx="10515600" cy="4351338"/>
+            <a:off x="628650" y="1825625"/>
+            <a:ext cx="7886700" cy="4351338"/>
           </a:xfrm>
           <a:prstGeom prst="rect">
             <a:avLst/>
@@ -2860,18 +2527,13 @@
               <a:rPr lang="en-US"/>
               <a:t>Fifth level</a:t>
             </a:r>
-          </a:p>
-        </p:txBody>
-      </p:sp>
-      <p:sp>
-        <p:nvSpPr>
-          <p:cNvPr id="4" name="Date Placeholder 3">
-            <a:extLst>
-              <a:ext uri="{FF2B5EF4-FFF2-40B4-BE49-F238E27FC236}">
-                <a16:creationId xmlns:a16="http://schemas.microsoft.com/office/drawing/2014/main" id="{EFAE3072-ED5E-4307-AC2E-3F61D21F15B0}"/>
-              </a:ext>
-            </a:extLst>
-          </p:cNvPr>
+            <a:endParaRPr lang="en-US" dirty="0"/>
+          </a:p>
+        </p:txBody>
+      </p:sp>
+      <p:sp>
+        <p:nvSpPr>
+          <p:cNvPr id="4" name="Date Placeholder 3"/>
           <p:cNvSpPr>
             <a:spLocks noGrp="1"/>
           </p:cNvSpPr>
@@ -2881,8 +2543,8 @@
         </p:nvSpPr>
         <p:spPr>
           <a:xfrm>
-            <a:off x="838200" y="6356350"/>
-            <a:ext cx="2743200" cy="365125"/>
+            <a:off x="628650" y="6356351"/>
+            <a:ext cx="2057400" cy="365125"/>
           </a:xfrm>
           <a:prstGeom prst="rect">
             <a:avLst/>
@@ -2904,7 +2566,7 @@
           <a:p>
             <a:fld id="{66276781-C39D-41A3-861A-51EAFABC82B2}" type="datetimeFigureOut">
               <a:rPr lang="en-US" smtClean="0"/>
-              <a:t>6/3/2018</a:t>
+              <a:t>6/5/2018</a:t>
             </a:fld>
             <a:endParaRPr lang="en-US"/>
           </a:p>
@@ -2912,13 +2574,7 @@
       </p:sp>
       <p:sp>
         <p:nvSpPr>
-          <p:cNvPr id="5" name="Footer Placeholder 4">
-            <a:extLst>
-              <a:ext uri="{FF2B5EF4-FFF2-40B4-BE49-F238E27FC236}">
-                <a16:creationId xmlns:a16="http://schemas.microsoft.com/office/drawing/2014/main" id="{B9B07662-801C-4DA9-B4D9-1E50D422B9B9}"/>
-              </a:ext>
-            </a:extLst>
-          </p:cNvPr>
+          <p:cNvPr id="5" name="Footer Placeholder 4"/>
           <p:cNvSpPr>
             <a:spLocks noGrp="1"/>
           </p:cNvSpPr>
@@ -2928,8 +2584,8 @@
         </p:nvSpPr>
         <p:spPr>
           <a:xfrm>
-            <a:off x="4038600" y="6356350"/>
-            <a:ext cx="4114800" cy="365125"/>
+            <a:off x="3028950" y="6356351"/>
+            <a:ext cx="3086100" cy="365125"/>
           </a:xfrm>
           <a:prstGeom prst="rect">
             <a:avLst/>
@@ -2955,13 +2611,7 @@
       </p:sp>
       <p:sp>
         <p:nvSpPr>
-          <p:cNvPr id="6" name="Slide Number Placeholder 5">
-            <a:extLst>
-              <a:ext uri="{FF2B5EF4-FFF2-40B4-BE49-F238E27FC236}">
-                <a16:creationId xmlns:a16="http://schemas.microsoft.com/office/drawing/2014/main" id="{26C47E4D-3C75-459D-899F-291453E8292F}"/>
-              </a:ext>
-            </a:extLst>
-          </p:cNvPr>
+          <p:cNvPr id="6" name="Slide Number Placeholder 5"/>
           <p:cNvSpPr>
             <a:spLocks noGrp="1"/>
           </p:cNvSpPr>
@@ -2971,8 +2621,8 @@
         </p:nvSpPr>
         <p:spPr>
           <a:xfrm>
-            <a:off x="8610600" y="6356350"/>
-            <a:ext cx="2743200" cy="365125"/>
+            <a:off x="6457950" y="6356351"/>
+            <a:ext cx="2057400" cy="365125"/>
           </a:xfrm>
           <a:prstGeom prst="rect">
             <a:avLst/>
@@ -3003,23 +2653,23 @@
     </p:spTree>
     <p:extLst>
       <p:ext uri="{BB962C8B-B14F-4D97-AF65-F5344CB8AC3E}">
-        <p14:creationId xmlns:p14="http://schemas.microsoft.com/office/powerpoint/2010/main" val="1253631644"/>
+        <p14:creationId xmlns:p14="http://schemas.microsoft.com/office/powerpoint/2010/main" val="1452577537"/>
       </p:ext>
     </p:extLst>
   </p:cSld>
   <p:clrMap bg1="lt1" tx1="dk1" bg2="lt2" tx2="dk2" accent1="accent1" accent2="accent2" accent3="accent3" accent4="accent4" accent5="accent5" accent6="accent6" hlink="hlink" folHlink="folHlink"/>
   <p:sldLayoutIdLst>
-    <p:sldLayoutId id="2147483649" r:id="rId1"/>
-    <p:sldLayoutId id="2147483650" r:id="rId2"/>
-    <p:sldLayoutId id="2147483651" r:id="rId3"/>
-    <p:sldLayoutId id="2147483652" r:id="rId4"/>
-    <p:sldLayoutId id="2147483653" r:id="rId5"/>
-    <p:sldLayoutId id="2147483654" r:id="rId6"/>
-    <p:sldLayoutId id="2147483655" r:id="rId7"/>
-    <p:sldLayoutId id="2147483656" r:id="rId8"/>
-    <p:sldLayoutId id="2147483657" r:id="rId9"/>
-    <p:sldLayoutId id="2147483658" r:id="rId10"/>
-    <p:sldLayoutId id="2147483659" r:id="rId11"/>
+    <p:sldLayoutId id="2147483661" r:id="rId1"/>
+    <p:sldLayoutId id="2147483662" r:id="rId2"/>
+    <p:sldLayoutId id="2147483663" r:id="rId3"/>
+    <p:sldLayoutId id="2147483664" r:id="rId4"/>
+    <p:sldLayoutId id="2147483665" r:id="rId5"/>
+    <p:sldLayoutId id="2147483666" r:id="rId6"/>
+    <p:sldLayoutId id="2147483667" r:id="rId7"/>
+    <p:sldLayoutId id="2147483668" r:id="rId8"/>
+    <p:sldLayoutId id="2147483669" r:id="rId9"/>
+    <p:sldLayoutId id="2147483670" r:id="rId10"/>
+    <p:sldLayoutId id="2147483671" r:id="rId11"/>
   </p:sldLayoutIdLst>
   <p:txStyles>
     <p:titleStyle>
@@ -3337,46 +2987,625 @@
             <p:ph type="ctrTitle"/>
           </p:nvPr>
         </p:nvSpPr>
-        <p:spPr/>
-        <p:txBody>
-          <a:bodyPr/>
-          <a:lstStyle/>
-          <a:p>
-            <a:r>
-              <a:rPr lang="en-US" dirty="0"/>
-              <a:t>Test</a:t>
-            </a:r>
-          </a:p>
-        </p:txBody>
-      </p:sp>
-      <p:sp>
-        <p:nvSpPr>
-          <p:cNvPr id="3" name="Subtitle 2">
+        <p:spPr>
+          <a:xfrm>
+            <a:off x="422254" y="1952073"/>
+            <a:ext cx="7281253" cy="1731498"/>
+          </a:xfrm>
+        </p:spPr>
+        <p:txBody>
+          <a:bodyPr anchor="t">
+            <a:normAutofit/>
+          </a:bodyPr>
+          <a:lstStyle/>
+          <a:p>
+            <a:pPr algn="l"/>
+            <a:r>
+              <a:rPr lang="en-US" sz="2800" dirty="0">
+                <a:latin typeface="+mn-lt"/>
+              </a:rPr>
+              <a:t>- </a:t>
+            </a:r>
+            <a:r>
+              <a:rPr lang="en-US" sz="2800" dirty="0">
+                <a:solidFill>
+                  <a:schemeClr val="accent1"/>
+                </a:solidFill>
+                <a:latin typeface="+mn-lt"/>
+                <a:hlinkClick r:id="rId2"/>
+              </a:rPr>
+              <a:t>www.winrepo.org</a:t>
+            </a:r>
+            <a:br>
+              <a:rPr lang="en-US" sz="2800" dirty="0">
+                <a:latin typeface="+mn-lt"/>
+              </a:rPr>
+            </a:br>
+            <a:r>
+              <a:rPr lang="en-US" sz="2800" dirty="0">
+                <a:latin typeface="+mn-lt"/>
+              </a:rPr>
+              <a:t>- over 700 profiles</a:t>
+            </a:r>
+            <a:br>
+              <a:rPr lang="en-US" sz="2800" dirty="0">
+                <a:latin typeface="+mn-lt"/>
+              </a:rPr>
+            </a:br>
+            <a:r>
+              <a:rPr lang="en-US" sz="2800" dirty="0">
+                <a:latin typeface="+mn-lt"/>
+              </a:rPr>
+              <a:t>- easy search</a:t>
+            </a:r>
+            <a:br>
+              <a:rPr lang="en-US" sz="2800" dirty="0">
+                <a:latin typeface="+mn-lt"/>
+              </a:rPr>
+            </a:br>
+            <a:r>
+              <a:rPr lang="en-US" sz="2800" dirty="0">
+                <a:latin typeface="+mn-lt"/>
+              </a:rPr>
+              <a:t>- recommendations</a:t>
+            </a:r>
+          </a:p>
+        </p:txBody>
+      </p:sp>
+      <p:pic>
+        <p:nvPicPr>
+          <p:cNvPr id="17" name="Picture 16">
             <a:extLst>
               <a:ext uri="{FF2B5EF4-FFF2-40B4-BE49-F238E27FC236}">
-                <a16:creationId xmlns:a16="http://schemas.microsoft.com/office/drawing/2014/main" id="{2200181F-6F8A-410C-BC10-447F32446837}"/>
+                <a16:creationId xmlns:a16="http://schemas.microsoft.com/office/drawing/2014/main" id="{E2A52DF3-1305-4BEA-BFA4-C644F5C1A1B8}"/>
               </a:ext>
             </a:extLst>
           </p:cNvPr>
-          <p:cNvSpPr>
-            <a:spLocks noGrp="1"/>
-          </p:cNvSpPr>
-          <p:nvPr>
-            <p:ph type="subTitle" idx="1"/>
-          </p:nvPr>
-        </p:nvSpPr>
-        <p:spPr/>
-        <p:txBody>
-          <a:bodyPr/>
-          <a:lstStyle/>
-          <a:p>
-            <a:r>
-              <a:rPr lang="en-US"/>
-              <a:t>WinRepo</a:t>
-            </a:r>
-          </a:p>
-        </p:txBody>
-      </p:sp>
+          <p:cNvPicPr>
+            <a:picLocks noChangeAspect="1"/>
+          </p:cNvPicPr>
+          <p:nvPr/>
+        </p:nvPicPr>
+        <p:blipFill>
+          <a:blip r:embed="rId3">
+            <a:extLst>
+              <a:ext uri="{28A0092B-C50C-407E-A947-70E740481C1C}">
+                <a14:useLocalDpi xmlns:a14="http://schemas.microsoft.com/office/drawing/2010/main" val="0"/>
+              </a:ext>
+            </a:extLst>
+          </a:blip>
+          <a:stretch>
+            <a:fillRect/>
+          </a:stretch>
+        </p:blipFill>
+        <p:spPr>
+          <a:xfrm>
+            <a:off x="5096116" y="2036796"/>
+            <a:ext cx="3614741" cy="1137634"/>
+          </a:xfrm>
+          <a:prstGeom prst="rect">
+            <a:avLst/>
+          </a:prstGeom>
+        </p:spPr>
+      </p:pic>
+      <p:pic>
+        <p:nvPicPr>
+          <p:cNvPr id="20" name="Picture 19" descr="A close up of a map&#10;&#10;Description generated with high confidence">
+            <a:extLst>
+              <a:ext uri="{FF2B5EF4-FFF2-40B4-BE49-F238E27FC236}">
+                <a16:creationId xmlns:a16="http://schemas.microsoft.com/office/drawing/2014/main" id="{C3FAA2B8-4C17-41D7-B409-AB83A974005F}"/>
+              </a:ext>
+            </a:extLst>
+          </p:cNvPr>
+          <p:cNvPicPr>
+            <a:picLocks noChangeAspect="1"/>
+          </p:cNvPicPr>
+          <p:nvPr/>
+        </p:nvPicPr>
+        <p:blipFill>
+          <a:blip r:embed="rId4">
+            <a:extLst>
+              <a:ext uri="{28A0092B-C50C-407E-A947-70E740481C1C}">
+                <a14:useLocalDpi xmlns:a14="http://schemas.microsoft.com/office/drawing/2010/main" val="0"/>
+              </a:ext>
+            </a:extLst>
+          </a:blip>
+          <a:stretch>
+            <a:fillRect/>
+          </a:stretch>
+        </p:blipFill>
+        <p:spPr>
+          <a:xfrm>
+            <a:off x="4934249" y="3330433"/>
+            <a:ext cx="3938476" cy="2405796"/>
+          </a:xfrm>
+          <a:prstGeom prst="rect">
+            <a:avLst/>
+          </a:prstGeom>
+        </p:spPr>
+      </p:pic>
+      <p:pic>
+        <p:nvPicPr>
+          <p:cNvPr id="1026" name="Picture 2" descr="Image result for marie curie alumni association">
+            <a:extLst>
+              <a:ext uri="{FF2B5EF4-FFF2-40B4-BE49-F238E27FC236}">
+                <a16:creationId xmlns:a16="http://schemas.microsoft.com/office/drawing/2014/main" id="{4E282AC9-F0C3-42DE-AD5C-30A8950F57DA}"/>
+              </a:ext>
+            </a:extLst>
+          </p:cNvPr>
+          <p:cNvPicPr>
+            <a:picLocks noChangeAspect="1" noChangeArrowheads="1"/>
+          </p:cNvPicPr>
+          <p:nvPr/>
+        </p:nvPicPr>
+        <p:blipFill>
+          <a:blip r:embed="rId5">
+            <a:extLst>
+              <a:ext uri="{28A0092B-C50C-407E-A947-70E740481C1C}">
+                <a14:useLocalDpi xmlns:a14="http://schemas.microsoft.com/office/drawing/2010/main" val="0"/>
+              </a:ext>
+            </a:extLst>
+          </a:blip>
+          <a:srcRect/>
+          <a:stretch>
+            <a:fillRect/>
+          </a:stretch>
+        </p:blipFill>
+        <p:spPr bwMode="auto">
+          <a:xfrm>
+            <a:off x="8281027" y="6206646"/>
+            <a:ext cx="591698" cy="572871"/>
+          </a:xfrm>
+          <a:prstGeom prst="rect">
+            <a:avLst/>
+          </a:prstGeom>
+          <a:noFill/>
+          <a:extLst>
+            <a:ext uri="{909E8E84-426E-40DD-AFC4-6F175D3DCCD1}">
+              <a14:hiddenFill xmlns:a14="http://schemas.microsoft.com/office/drawing/2010/main">
+                <a:solidFill>
+                  <a:srgbClr val="FFFFFF"/>
+                </a:solidFill>
+              </a14:hiddenFill>
+            </a:ext>
+          </a:extLst>
+        </p:spPr>
+      </p:pic>
+      <p:sp>
+        <p:nvSpPr>
+          <p:cNvPr id="21" name="TextBox 20">
+            <a:extLst>
+              <a:ext uri="{FF2B5EF4-FFF2-40B4-BE49-F238E27FC236}">
+                <a16:creationId xmlns:a16="http://schemas.microsoft.com/office/drawing/2014/main" id="{5DA7BCFD-EAC5-49E6-AE6C-87DB2003E3F7}"/>
+              </a:ext>
+            </a:extLst>
+          </p:cNvPr>
+          <p:cNvSpPr txBox="1"/>
+          <p:nvPr/>
+        </p:nvSpPr>
+        <p:spPr>
+          <a:xfrm>
+            <a:off x="1295623" y="990645"/>
+            <a:ext cx="7281253" cy="584775"/>
+          </a:xfrm>
+          <a:prstGeom prst="rect">
+            <a:avLst/>
+          </a:prstGeom>
+          <a:noFill/>
+        </p:spPr>
+        <p:txBody>
+          <a:bodyPr wrap="square" rtlCol="0">
+            <a:spAutoFit/>
+          </a:bodyPr>
+          <a:lstStyle/>
+          <a:p>
+            <a:r>
+              <a:rPr lang="en-US" sz="3200" b="1" dirty="0">
+                <a:solidFill>
+                  <a:schemeClr val="tx2"/>
+                </a:solidFill>
+              </a:rPr>
+              <a:t>Repository for women in neuroscience</a:t>
+            </a:r>
+            <a:endParaRPr lang="en-US" sz="3200" dirty="0"/>
+          </a:p>
+        </p:txBody>
+      </p:sp>
+      <p:pic>
+        <p:nvPicPr>
+          <p:cNvPr id="25" name="Picture 24" descr="A drawing of a cartoon character&#10;&#10;Description generated with high confidence">
+            <a:extLst>
+              <a:ext uri="{FF2B5EF4-FFF2-40B4-BE49-F238E27FC236}">
+                <a16:creationId xmlns:a16="http://schemas.microsoft.com/office/drawing/2014/main" id="{928077AE-D941-4C1F-8E29-40312A7F4C9F}"/>
+              </a:ext>
+            </a:extLst>
+          </p:cNvPr>
+          <p:cNvPicPr>
+            <a:picLocks noChangeAspect="1"/>
+          </p:cNvPicPr>
+          <p:nvPr/>
+        </p:nvPicPr>
+        <p:blipFill>
+          <a:blip r:embed="rId6">
+            <a:extLst>
+              <a:ext uri="{28A0092B-C50C-407E-A947-70E740481C1C}">
+                <a14:useLocalDpi xmlns:a14="http://schemas.microsoft.com/office/drawing/2010/main" val="0"/>
+              </a:ext>
+            </a:extLst>
+          </a:blip>
+          <a:stretch>
+            <a:fillRect/>
+          </a:stretch>
+        </p:blipFill>
+        <p:spPr>
+          <a:xfrm>
+            <a:off x="80923" y="78369"/>
+            <a:ext cx="2129921" cy="532480"/>
+          </a:xfrm>
+          <a:prstGeom prst="rect">
+            <a:avLst/>
+          </a:prstGeom>
+        </p:spPr>
+      </p:pic>
+      <p:sp>
+        <p:nvSpPr>
+          <p:cNvPr id="22" name="TextBox 21">
+            <a:extLst>
+              <a:ext uri="{FF2B5EF4-FFF2-40B4-BE49-F238E27FC236}">
+                <a16:creationId xmlns:a16="http://schemas.microsoft.com/office/drawing/2014/main" id="{F22FA8CA-A505-4E6D-938B-C3D1194D0D34}"/>
+              </a:ext>
+            </a:extLst>
+          </p:cNvPr>
+          <p:cNvSpPr txBox="1"/>
+          <p:nvPr/>
+        </p:nvSpPr>
+        <p:spPr>
+          <a:xfrm>
+            <a:off x="422254" y="3703279"/>
+            <a:ext cx="4433208" cy="1815882"/>
+          </a:xfrm>
+          <a:prstGeom prst="rect">
+            <a:avLst/>
+          </a:prstGeom>
+          <a:noFill/>
+        </p:spPr>
+        <p:txBody>
+          <a:bodyPr wrap="square" rtlCol="0">
+            <a:spAutoFit/>
+          </a:bodyPr>
+          <a:lstStyle/>
+          <a:p>
+            <a:r>
+              <a:rPr lang="en-US" sz="2800" b="1" dirty="0">
+                <a:solidFill>
+                  <a:schemeClr val="accent2"/>
+                </a:solidFill>
+              </a:rPr>
+              <a:t>Support us:</a:t>
+            </a:r>
+          </a:p>
+          <a:p>
+            <a:pPr marL="285750" indent="-285750">
+              <a:buFont typeface="Wingdings" panose="05000000000000000000" pitchFamily="2" charset="2"/>
+              <a:buChar char="Ø"/>
+            </a:pPr>
+            <a:r>
+              <a:rPr lang="en-US" sz="2800" dirty="0"/>
+              <a:t>sign up</a:t>
+            </a:r>
+          </a:p>
+          <a:p>
+            <a:pPr marL="285750" indent="-285750">
+              <a:buFont typeface="Wingdings" panose="05000000000000000000" pitchFamily="2" charset="2"/>
+              <a:buChar char="Ø"/>
+            </a:pPr>
+            <a:r>
+              <a:rPr lang="en-US" sz="2800" dirty="0"/>
+              <a:t>spread the word</a:t>
+            </a:r>
+          </a:p>
+          <a:p>
+            <a:pPr marL="285750" indent="-285750">
+              <a:buFont typeface="Wingdings" panose="05000000000000000000" pitchFamily="2" charset="2"/>
+              <a:buChar char="Ø"/>
+            </a:pPr>
+            <a:r>
+              <a:rPr lang="en-US" sz="2800" dirty="0"/>
+              <a:t>submit recommendations</a:t>
+            </a:r>
+          </a:p>
+        </p:txBody>
+      </p:sp>
+      <p:pic>
+        <p:nvPicPr>
+          <p:cNvPr id="27" name="Picture 26" descr="A person posing for the camera&#10;&#10;Description generated with very high confidence">
+            <a:extLst>
+              <a:ext uri="{FF2B5EF4-FFF2-40B4-BE49-F238E27FC236}">
+                <a16:creationId xmlns:a16="http://schemas.microsoft.com/office/drawing/2014/main" id="{7DC37822-9285-4538-A353-4C1CCE894FCC}"/>
+              </a:ext>
+            </a:extLst>
+          </p:cNvPr>
+          <p:cNvPicPr>
+            <a:picLocks noChangeAspect="1"/>
+          </p:cNvPicPr>
+          <p:nvPr/>
+        </p:nvPicPr>
+        <p:blipFill>
+          <a:blip r:embed="rId7">
+            <a:extLst>
+              <a:ext uri="{28A0092B-C50C-407E-A947-70E740481C1C}">
+                <a14:useLocalDpi xmlns:a14="http://schemas.microsoft.com/office/drawing/2010/main" val="0"/>
+              </a:ext>
+            </a:extLst>
+          </a:blip>
+          <a:stretch>
+            <a:fillRect/>
+          </a:stretch>
+        </p:blipFill>
+        <p:spPr>
+          <a:xfrm>
+            <a:off x="271275" y="6047649"/>
+            <a:ext cx="731520" cy="731520"/>
+          </a:xfrm>
+          <a:prstGeom prst="ellipse">
+            <a:avLst/>
+          </a:prstGeom>
+          <a:ln w="57150" cap="rnd">
+            <a:solidFill>
+              <a:srgbClr val="C8C6BD"/>
+            </a:solidFill>
+            <a:prstDash val="solid"/>
+          </a:ln>
+          <a:effectLst>
+            <a:outerShdw blurRad="127000" algn="bl" rotWithShape="0">
+              <a:srgbClr val="000000"/>
+            </a:outerShdw>
+          </a:effectLst>
+          <a:scene3d>
+            <a:camera prst="perspectiveFront" fov="5400000"/>
+            <a:lightRig rig="threePt" dir="t">
+              <a:rot lat="0" lon="0" rev="19200000"/>
+            </a:lightRig>
+          </a:scene3d>
+          <a:sp3d extrusionH="25400">
+            <a:extrusionClr>
+              <a:srgbClr val="000000"/>
+            </a:extrusionClr>
+          </a:sp3d>
+        </p:spPr>
+      </p:pic>
+      <p:pic>
+        <p:nvPicPr>
+          <p:cNvPr id="29" name="Picture 28" descr="A person smiling for the camera&#10;&#10;Description generated with very high confidence">
+            <a:extLst>
+              <a:ext uri="{FF2B5EF4-FFF2-40B4-BE49-F238E27FC236}">
+                <a16:creationId xmlns:a16="http://schemas.microsoft.com/office/drawing/2014/main" id="{2A21F975-0C99-4233-A082-B7BB5F597CFB}"/>
+              </a:ext>
+            </a:extLst>
+          </p:cNvPr>
+          <p:cNvPicPr>
+            <a:picLocks noChangeAspect="1"/>
+          </p:cNvPicPr>
+          <p:nvPr/>
+        </p:nvPicPr>
+        <p:blipFill>
+          <a:blip r:embed="rId8">
+            <a:extLst>
+              <a:ext uri="{28A0092B-C50C-407E-A947-70E740481C1C}">
+                <a14:useLocalDpi xmlns:a14="http://schemas.microsoft.com/office/drawing/2010/main" val="0"/>
+              </a:ext>
+            </a:extLst>
+          </a:blip>
+          <a:stretch>
+            <a:fillRect/>
+          </a:stretch>
+        </p:blipFill>
+        <p:spPr>
+          <a:xfrm>
+            <a:off x="1020004" y="6047649"/>
+            <a:ext cx="731520" cy="731520"/>
+          </a:xfrm>
+          <a:prstGeom prst="ellipse">
+            <a:avLst/>
+          </a:prstGeom>
+          <a:ln w="57150" cap="rnd">
+            <a:solidFill>
+              <a:srgbClr val="C8C6BD"/>
+            </a:solidFill>
+            <a:prstDash val="solid"/>
+          </a:ln>
+          <a:effectLst>
+            <a:outerShdw blurRad="127000" algn="bl" rotWithShape="0">
+              <a:srgbClr val="000000"/>
+            </a:outerShdw>
+          </a:effectLst>
+          <a:scene3d>
+            <a:camera prst="perspectiveFront" fov="5400000"/>
+            <a:lightRig rig="threePt" dir="t">
+              <a:rot lat="0" lon="0" rev="19200000"/>
+            </a:lightRig>
+          </a:scene3d>
+          <a:sp3d extrusionH="25400">
+            <a:extrusionClr>
+              <a:srgbClr val="000000"/>
+            </a:extrusionClr>
+          </a:sp3d>
+        </p:spPr>
+      </p:pic>
+      <p:pic>
+        <p:nvPicPr>
+          <p:cNvPr id="31" name="Picture 30" descr="A person posing for the camera&#10;&#10;Description generated with very high confidence">
+            <a:extLst>
+              <a:ext uri="{FF2B5EF4-FFF2-40B4-BE49-F238E27FC236}">
+                <a16:creationId xmlns:a16="http://schemas.microsoft.com/office/drawing/2014/main" id="{9F544F71-F342-47D6-9CAB-618D5B81E5CD}"/>
+              </a:ext>
+            </a:extLst>
+          </p:cNvPr>
+          <p:cNvPicPr>
+            <a:picLocks noChangeAspect="1"/>
+          </p:cNvPicPr>
+          <p:nvPr/>
+        </p:nvPicPr>
+        <p:blipFill>
+          <a:blip r:embed="rId9">
+            <a:extLst>
+              <a:ext uri="{28A0092B-C50C-407E-A947-70E740481C1C}">
+                <a14:useLocalDpi xmlns:a14="http://schemas.microsoft.com/office/drawing/2010/main" val="0"/>
+              </a:ext>
+            </a:extLst>
+          </a:blip>
+          <a:stretch>
+            <a:fillRect/>
+          </a:stretch>
+        </p:blipFill>
+        <p:spPr>
+          <a:xfrm>
+            <a:off x="1768733" y="6047649"/>
+            <a:ext cx="731520" cy="731520"/>
+          </a:xfrm>
+          <a:prstGeom prst="ellipse">
+            <a:avLst/>
+          </a:prstGeom>
+          <a:ln w="57150" cap="rnd">
+            <a:solidFill>
+              <a:srgbClr val="C8C6BD"/>
+            </a:solidFill>
+            <a:prstDash val="solid"/>
+          </a:ln>
+          <a:effectLst>
+            <a:outerShdw blurRad="127000" algn="bl" rotWithShape="0">
+              <a:srgbClr val="000000"/>
+            </a:outerShdw>
+          </a:effectLst>
+          <a:scene3d>
+            <a:camera prst="perspectiveFront" fov="5400000"/>
+            <a:lightRig rig="threePt" dir="t">
+              <a:rot lat="0" lon="0" rev="19200000"/>
+            </a:lightRig>
+          </a:scene3d>
+          <a:sp3d extrusionH="25400">
+            <a:extrusionClr>
+              <a:srgbClr val="000000"/>
+            </a:extrusionClr>
+          </a:sp3d>
+        </p:spPr>
+      </p:pic>
+      <p:pic>
+        <p:nvPicPr>
+          <p:cNvPr id="1025" name="Picture 1024" descr="A person smiling for the camera&#10;&#10;Description generated with very high confidence">
+            <a:extLst>
+              <a:ext uri="{FF2B5EF4-FFF2-40B4-BE49-F238E27FC236}">
+                <a16:creationId xmlns:a16="http://schemas.microsoft.com/office/drawing/2014/main" id="{D8812E35-6DE9-4204-B178-86A9E6D745CF}"/>
+              </a:ext>
+            </a:extLst>
+          </p:cNvPr>
+          <p:cNvPicPr>
+            <a:picLocks noChangeAspect="1"/>
+          </p:cNvPicPr>
+          <p:nvPr/>
+        </p:nvPicPr>
+        <p:blipFill>
+          <a:blip r:embed="rId10">
+            <a:extLst>
+              <a:ext uri="{28A0092B-C50C-407E-A947-70E740481C1C}">
+                <a14:useLocalDpi xmlns:a14="http://schemas.microsoft.com/office/drawing/2010/main" val="0"/>
+              </a:ext>
+            </a:extLst>
+          </a:blip>
+          <a:stretch>
+            <a:fillRect/>
+          </a:stretch>
+        </p:blipFill>
+        <p:spPr>
+          <a:xfrm>
+            <a:off x="2517462" y="6047649"/>
+            <a:ext cx="731520" cy="731520"/>
+          </a:xfrm>
+          <a:prstGeom prst="ellipse">
+            <a:avLst/>
+          </a:prstGeom>
+          <a:ln w="57150" cap="rnd">
+            <a:solidFill>
+              <a:srgbClr val="C8C6BD"/>
+            </a:solidFill>
+            <a:prstDash val="solid"/>
+          </a:ln>
+          <a:effectLst>
+            <a:outerShdw blurRad="127000" algn="bl" rotWithShape="0">
+              <a:srgbClr val="000000"/>
+            </a:outerShdw>
+          </a:effectLst>
+          <a:scene3d>
+            <a:camera prst="perspectiveFront" fov="5400000"/>
+            <a:lightRig rig="threePt" dir="t">
+              <a:rot lat="0" lon="0" rev="19200000"/>
+            </a:lightRig>
+          </a:scene3d>
+          <a:sp3d extrusionH="25400">
+            <a:extrusionClr>
+              <a:srgbClr val="000000"/>
+            </a:extrusionClr>
+          </a:sp3d>
+        </p:spPr>
+      </p:pic>
+      <p:pic>
+        <p:nvPicPr>
+          <p:cNvPr id="1028" name="Picture 1027" descr="A close up of a person&#10;&#10;Description generated with very high confidence">
+            <a:extLst>
+              <a:ext uri="{FF2B5EF4-FFF2-40B4-BE49-F238E27FC236}">
+                <a16:creationId xmlns:a16="http://schemas.microsoft.com/office/drawing/2014/main" id="{AEFEBB32-A883-4239-9B3F-9E1E971EB50F}"/>
+              </a:ext>
+            </a:extLst>
+          </p:cNvPr>
+          <p:cNvPicPr>
+            <a:picLocks noChangeAspect="1"/>
+          </p:cNvPicPr>
+          <p:nvPr/>
+        </p:nvPicPr>
+        <p:blipFill>
+          <a:blip r:embed="rId11">
+            <a:extLst>
+              <a:ext uri="{28A0092B-C50C-407E-A947-70E740481C1C}">
+                <a14:useLocalDpi xmlns:a14="http://schemas.microsoft.com/office/drawing/2010/main" val="0"/>
+              </a:ext>
+            </a:extLst>
+          </a:blip>
+          <a:stretch>
+            <a:fillRect/>
+          </a:stretch>
+        </p:blipFill>
+        <p:spPr>
+          <a:xfrm>
+            <a:off x="3266193" y="6047302"/>
+            <a:ext cx="731520" cy="731867"/>
+          </a:xfrm>
+          <a:prstGeom prst="ellipse">
+            <a:avLst/>
+          </a:prstGeom>
+          <a:ln w="57150" cap="rnd">
+            <a:solidFill>
+              <a:srgbClr val="C8C6BD"/>
+            </a:solidFill>
+            <a:prstDash val="solid"/>
+          </a:ln>
+          <a:effectLst>
+            <a:outerShdw blurRad="127000" algn="bl" rotWithShape="0">
+              <a:srgbClr val="000000"/>
+            </a:outerShdw>
+          </a:effectLst>
+          <a:scene3d>
+            <a:camera prst="perspectiveFront" fov="5400000"/>
+            <a:lightRig rig="threePt" dir="t">
+              <a:rot lat="0" lon="0" rev="19200000"/>
+            </a:lightRig>
+          </a:scene3d>
+          <a:sp3d extrusionH="25400">
+            <a:extrusionClr>
+              <a:srgbClr val="000000"/>
+            </a:extrusionClr>
+          </a:sp3d>
+        </p:spPr>
+      </p:pic>
     </p:spTree>
     <p:extLst>
       <p:ext uri="{BB962C8B-B14F-4D97-AF65-F5344CB8AC3E}">
@@ -3393,7 +3622,7 @@
 <file path=ppt/theme/theme1.xml><?xml version="1.0" encoding="utf-8"?>
 <a:theme xmlns:a="http://schemas.openxmlformats.org/drawingml/2006/main" name="Office Theme">
   <a:themeElements>
-    <a:clrScheme name="Office">
+    <a:clrScheme name="Custom 5">
       <a:dk1>
         <a:sysClr val="windowText" lastClr="000000"/>
       </a:dk1>
@@ -3401,37 +3630,37 @@
         <a:sysClr val="window" lastClr="FFFFFF"/>
       </a:lt1>
       <a:dk2>
-        <a:srgbClr val="44546A"/>
+        <a:srgbClr val="555555"/>
       </a:dk2>
       <a:lt2>
-        <a:srgbClr val="E7E6E6"/>
+        <a:srgbClr val="F2F2F2"/>
       </a:lt2>
       <a:accent1>
-        <a:srgbClr val="4472C4"/>
+        <a:srgbClr val="10898B"/>
       </a:accent1>
       <a:accent2>
-        <a:srgbClr val="ED7D31"/>
+        <a:srgbClr val="CC063E"/>
       </a:accent2>
       <a:accent3>
-        <a:srgbClr val="A5A5A5"/>
+        <a:srgbClr val="E2D9C2"/>
       </a:accent3>
       <a:accent4>
-        <a:srgbClr val="FFC000"/>
+        <a:srgbClr val="E83535"/>
       </a:accent4>
       <a:accent5>
-        <a:srgbClr val="5B9BD5"/>
+        <a:srgbClr val="FD9407"/>
       </a:accent5>
       <a:accent6>
-        <a:srgbClr val="70AD47"/>
+        <a:srgbClr val="999999"/>
       </a:accent6>
       <a:hlink>
-        <a:srgbClr val="0563C1"/>
+        <a:srgbClr val="10898B"/>
       </a:hlink>
       <a:folHlink>
-        <a:srgbClr val="954F72"/>
+        <a:srgbClr val="E2D9C2"/>
       </a:folHlink>
     </a:clrScheme>
-    <a:fontScheme name="Office">
+    <a:fontScheme name="Office Theme">
       <a:majorFont>
         <a:latin typeface="Calibri Light" panose="020F0302020204030204"/>
         <a:ea typeface=""/>
@@ -3466,23 +3695,6 @@
         <a:font script="Viet" typeface="Times New Roman"/>
         <a:font script="Uigh" typeface="Microsoft Uighur"/>
         <a:font script="Geor" typeface="Sylfaen"/>
-        <a:font script="Armn" typeface="Arial"/>
-        <a:font script="Bugi" typeface="Leelawadee UI"/>
-        <a:font script="Bopo" typeface="Microsoft JhengHei"/>
-        <a:font script="Java" typeface="Javanese Text"/>
-        <a:font script="Lisu" typeface="Segoe UI"/>
-        <a:font script="Mymr" typeface="Myanmar Text"/>
-        <a:font script="Nkoo" typeface="Ebrima"/>
-        <a:font script="Olck" typeface="Nirmala UI"/>
-        <a:font script="Osma" typeface="Ebrima"/>
-        <a:font script="Phag" typeface="Phagspa"/>
-        <a:font script="Syrn" typeface="Estrangelo Edessa"/>
-        <a:font script="Syrj" typeface="Estrangelo Edessa"/>
-        <a:font script="Syre" typeface="Estrangelo Edessa"/>
-        <a:font script="Sora" typeface="Nirmala UI"/>
-        <a:font script="Tale" typeface="Microsoft Tai Le"/>
-        <a:font script="Talu" typeface="Microsoft New Tai Lue"/>
-        <a:font script="Tfng" typeface="Ebrima"/>
       </a:majorFont>
       <a:minorFont>
         <a:latin typeface="Calibri" panose="020F0502020204030204"/>
@@ -3518,26 +3730,9 @@
         <a:font script="Viet" typeface="Arial"/>
         <a:font script="Uigh" typeface="Microsoft Uighur"/>
         <a:font script="Geor" typeface="Sylfaen"/>
-        <a:font script="Armn" typeface="Arial"/>
-        <a:font script="Bugi" typeface="Leelawadee UI"/>
-        <a:font script="Bopo" typeface="Microsoft JhengHei"/>
-        <a:font script="Java" typeface="Javanese Text"/>
-        <a:font script="Lisu" typeface="Segoe UI"/>
-        <a:font script="Mymr" typeface="Myanmar Text"/>
-        <a:font script="Nkoo" typeface="Ebrima"/>
-        <a:font script="Olck" typeface="Nirmala UI"/>
-        <a:font script="Osma" typeface="Ebrima"/>
-        <a:font script="Phag" typeface="Phagspa"/>
-        <a:font script="Syrn" typeface="Estrangelo Edessa"/>
-        <a:font script="Syrj" typeface="Estrangelo Edessa"/>
-        <a:font script="Syre" typeface="Estrangelo Edessa"/>
-        <a:font script="Sora" typeface="Nirmala UI"/>
-        <a:font script="Tale" typeface="Microsoft Tai Le"/>
-        <a:font script="Talu" typeface="Microsoft New Tai Lue"/>
-        <a:font script="Tfng" typeface="Ebrima"/>
       </a:minorFont>
     </a:fontScheme>
-    <a:fmtScheme name="Office">
+    <a:fmtScheme name="Office Theme">
       <a:fillStyleLst>
         <a:solidFill>
           <a:schemeClr val="phClr"/>

</xml_diff>